<commit_message>
demo ok and update pptx
</commit_message>
<xml_diff>
--- a/SSELaticeAttackFerrara.pptx
+++ b/SSELaticeAttackFerrara.pptx
@@ -5,10 +5,10 @@
     <p:sldMasterId id="2147483648" r:id="rId1"/>
   </p:sldMasterIdLst>
   <p:notesMasterIdLst>
-    <p:notesMasterId r:id="rId29"/>
+    <p:notesMasterId r:id="rId39"/>
   </p:notesMasterIdLst>
   <p:handoutMasterIdLst>
-    <p:handoutMasterId r:id="rId30"/>
+    <p:handoutMasterId r:id="rId40"/>
   </p:handoutMasterIdLst>
   <p:sldIdLst>
     <p:sldId id="256" r:id="rId2"/>
@@ -19,25 +19,35 @@
     <p:sldId id="284" r:id="rId7"/>
     <p:sldId id="262" r:id="rId8"/>
     <p:sldId id="263" r:id="rId9"/>
-    <p:sldId id="264" r:id="rId10"/>
-    <p:sldId id="259" r:id="rId11"/>
-    <p:sldId id="260" r:id="rId12"/>
-    <p:sldId id="272" r:id="rId13"/>
-    <p:sldId id="275" r:id="rId14"/>
-    <p:sldId id="276" r:id="rId15"/>
-    <p:sldId id="285" r:id="rId16"/>
-    <p:sldId id="277" r:id="rId17"/>
-    <p:sldId id="279" r:id="rId18"/>
-    <p:sldId id="278" r:id="rId19"/>
-    <p:sldId id="266" r:id="rId20"/>
-    <p:sldId id="273" r:id="rId21"/>
-    <p:sldId id="267" r:id="rId22"/>
-    <p:sldId id="268" r:id="rId23"/>
-    <p:sldId id="280" r:id="rId24"/>
-    <p:sldId id="281" r:id="rId25"/>
-    <p:sldId id="269" r:id="rId26"/>
-    <p:sldId id="271" r:id="rId27"/>
-    <p:sldId id="270" r:id="rId28"/>
+    <p:sldId id="286" r:id="rId10"/>
+    <p:sldId id="287" r:id="rId11"/>
+    <p:sldId id="289" r:id="rId12"/>
+    <p:sldId id="288" r:id="rId13"/>
+    <p:sldId id="290" r:id="rId14"/>
+    <p:sldId id="264" r:id="rId15"/>
+    <p:sldId id="291" r:id="rId16"/>
+    <p:sldId id="292" r:id="rId17"/>
+    <p:sldId id="293" r:id="rId18"/>
+    <p:sldId id="294" r:id="rId19"/>
+    <p:sldId id="259" r:id="rId20"/>
+    <p:sldId id="260" r:id="rId21"/>
+    <p:sldId id="272" r:id="rId22"/>
+    <p:sldId id="295" r:id="rId23"/>
+    <p:sldId id="275" r:id="rId24"/>
+    <p:sldId id="276" r:id="rId25"/>
+    <p:sldId id="285" r:id="rId26"/>
+    <p:sldId id="277" r:id="rId27"/>
+    <p:sldId id="279" r:id="rId28"/>
+    <p:sldId id="278" r:id="rId29"/>
+    <p:sldId id="266" r:id="rId30"/>
+    <p:sldId id="273" r:id="rId31"/>
+    <p:sldId id="267" r:id="rId32"/>
+    <p:sldId id="268" r:id="rId33"/>
+    <p:sldId id="280" r:id="rId34"/>
+    <p:sldId id="281" r:id="rId35"/>
+    <p:sldId id="269" r:id="rId36"/>
+    <p:sldId id="296" r:id="rId37"/>
+    <p:sldId id="270" r:id="rId38"/>
   </p:sldIdLst>
   <p:sldSz cx="12192000" cy="6858000"/>
   <p:notesSz cx="6858000" cy="9144000"/>
@@ -238,7 +248,7 @@
           <a:p>
             <a:fld id="{E119955A-8F8B-4836-9D5D-75BC53B05DFA}" type="datetimeFigureOut">
               <a:rPr lang="fr-CH" smtClean="0"/>
-              <a:t>13.03.2025</a:t>
+              <a:t>14.03.2025</a:t>
             </a:fld>
             <a:endParaRPr lang="fr-CH"/>
           </a:p>
@@ -415,7 +425,7 @@
           <a:p>
             <a:fld id="{4B7F84FC-00BA-4296-9B1E-E241E38FBA94}" type="datetimeFigureOut">
               <a:rPr lang="fr-CH" smtClean="0"/>
-              <a:t>13.03.2025</a:t>
+              <a:t>14.03.2025</a:t>
             </a:fld>
             <a:endParaRPr lang="fr-CH"/>
           </a:p>
@@ -832,7 +842,7 @@
           <a:p>
             <a:fld id="{F57DD76F-4C7B-46A7-B9DC-35AD90C344BA}" type="datetimeFigureOut">
               <a:rPr lang="fr-CH" smtClean="0"/>
-              <a:t>13.03.2025</a:t>
+              <a:t>14.03.2025</a:t>
             </a:fld>
             <a:endParaRPr lang="fr-CH"/>
           </a:p>
@@ -1032,7 +1042,7 @@
           <a:p>
             <a:fld id="{F57DD76F-4C7B-46A7-B9DC-35AD90C344BA}" type="datetimeFigureOut">
               <a:rPr lang="fr-CH" smtClean="0"/>
-              <a:t>13.03.2025</a:t>
+              <a:t>14.03.2025</a:t>
             </a:fld>
             <a:endParaRPr lang="fr-CH"/>
           </a:p>
@@ -1242,7 +1252,7 @@
           <a:p>
             <a:fld id="{F57DD76F-4C7B-46A7-B9DC-35AD90C344BA}" type="datetimeFigureOut">
               <a:rPr lang="fr-CH" smtClean="0"/>
-              <a:t>13.03.2025</a:t>
+              <a:t>14.03.2025</a:t>
             </a:fld>
             <a:endParaRPr lang="fr-CH"/>
           </a:p>
@@ -1442,7 +1452,7 @@
           <a:p>
             <a:fld id="{F57DD76F-4C7B-46A7-B9DC-35AD90C344BA}" type="datetimeFigureOut">
               <a:rPr lang="fr-CH" smtClean="0"/>
-              <a:t>13.03.2025</a:t>
+              <a:t>14.03.2025</a:t>
             </a:fld>
             <a:endParaRPr lang="fr-CH"/>
           </a:p>
@@ -1718,7 +1728,7 @@
           <a:p>
             <a:fld id="{F57DD76F-4C7B-46A7-B9DC-35AD90C344BA}" type="datetimeFigureOut">
               <a:rPr lang="fr-CH" smtClean="0"/>
-              <a:t>13.03.2025</a:t>
+              <a:t>14.03.2025</a:t>
             </a:fld>
             <a:endParaRPr lang="fr-CH"/>
           </a:p>
@@ -1986,7 +1996,7 @@
           <a:p>
             <a:fld id="{F57DD76F-4C7B-46A7-B9DC-35AD90C344BA}" type="datetimeFigureOut">
               <a:rPr lang="fr-CH" smtClean="0"/>
-              <a:t>13.03.2025</a:t>
+              <a:t>14.03.2025</a:t>
             </a:fld>
             <a:endParaRPr lang="fr-CH"/>
           </a:p>
@@ -2401,7 +2411,7 @@
           <a:p>
             <a:fld id="{F57DD76F-4C7B-46A7-B9DC-35AD90C344BA}" type="datetimeFigureOut">
               <a:rPr lang="fr-CH" smtClean="0"/>
-              <a:t>13.03.2025</a:t>
+              <a:t>14.03.2025</a:t>
             </a:fld>
             <a:endParaRPr lang="fr-CH"/>
           </a:p>
@@ -2543,7 +2553,7 @@
           <a:p>
             <a:fld id="{F57DD76F-4C7B-46A7-B9DC-35AD90C344BA}" type="datetimeFigureOut">
               <a:rPr lang="fr-CH" smtClean="0"/>
-              <a:t>13.03.2025</a:t>
+              <a:t>14.03.2025</a:t>
             </a:fld>
             <a:endParaRPr lang="fr-CH"/>
           </a:p>
@@ -2656,7 +2666,7 @@
           <a:p>
             <a:fld id="{F57DD76F-4C7B-46A7-B9DC-35AD90C344BA}" type="datetimeFigureOut">
               <a:rPr lang="fr-CH" smtClean="0"/>
-              <a:t>13.03.2025</a:t>
+              <a:t>14.03.2025</a:t>
             </a:fld>
             <a:endParaRPr lang="fr-CH"/>
           </a:p>
@@ -2969,7 +2979,7 @@
           <a:p>
             <a:fld id="{F57DD76F-4C7B-46A7-B9DC-35AD90C344BA}" type="datetimeFigureOut">
               <a:rPr lang="fr-CH" smtClean="0"/>
-              <a:t>13.03.2025</a:t>
+              <a:t>14.03.2025</a:t>
             </a:fld>
             <a:endParaRPr lang="fr-CH"/>
           </a:p>
@@ -3258,7 +3268,7 @@
           <a:p>
             <a:fld id="{F57DD76F-4C7B-46A7-B9DC-35AD90C344BA}" type="datetimeFigureOut">
               <a:rPr lang="fr-CH" smtClean="0"/>
-              <a:t>13.03.2025</a:t>
+              <a:t>14.03.2025</a:t>
             </a:fld>
             <a:endParaRPr lang="fr-CH"/>
           </a:p>
@@ -3501,7 +3511,7 @@
           <a:p>
             <a:fld id="{F57DD76F-4C7B-46A7-B9DC-35AD90C344BA}" type="datetimeFigureOut">
               <a:rPr lang="fr-CH" smtClean="0"/>
-              <a:t>13.03.2025</a:t>
+              <a:t>14.03.2025</a:t>
             </a:fld>
             <a:endParaRPr lang="fr-CH"/>
           </a:p>
@@ -3997,6 +4007,1224 @@
   <p:cSld>
     <p:spTree>
       <p:nvGrpSpPr>
+        <p:cNvPr id="1" name="">
+          <a:extLst>
+            <a:ext uri="{FF2B5EF4-FFF2-40B4-BE49-F238E27FC236}">
+              <a16:creationId xmlns:a16="http://schemas.microsoft.com/office/drawing/2014/main" id="{8FEBB08C-9689-2E79-B597-E1715884D75B}"/>
+            </a:ext>
+          </a:extLst>
+        </p:cNvPr>
+        <p:cNvGrpSpPr/>
+        <p:nvPr/>
+      </p:nvGrpSpPr>
+      <p:grpSpPr>
+        <a:xfrm>
+          <a:off x="0" y="0"/>
+          <a:ext cx="0" cy="0"/>
+          <a:chOff x="0" y="0"/>
+          <a:chExt cx="0" cy="0"/>
+        </a:xfrm>
+      </p:grpSpPr>
+      <p:sp>
+        <p:nvSpPr>
+          <p:cNvPr id="2" name="Titre 1">
+            <a:extLst>
+              <a:ext uri="{FF2B5EF4-FFF2-40B4-BE49-F238E27FC236}">
+                <a16:creationId xmlns:a16="http://schemas.microsoft.com/office/drawing/2014/main" id="{D25B67F9-33DA-7AB0-C366-F2532DE6901A}"/>
+              </a:ext>
+            </a:extLst>
+          </p:cNvPr>
+          <p:cNvSpPr>
+            <a:spLocks noGrp="1"/>
+          </p:cNvSpPr>
+          <p:nvPr>
+            <p:ph type="title"/>
+          </p:nvPr>
+        </p:nvSpPr>
+        <p:spPr/>
+        <p:txBody>
+          <a:bodyPr/>
+          <a:lstStyle/>
+          <a:p>
+            <a:r>
+              <a:rPr lang="fr-CH" dirty="0"/>
+              <a:t>SSH</a:t>
+            </a:r>
+          </a:p>
+        </p:txBody>
+      </p:sp>
+      <p:sp>
+        <p:nvSpPr>
+          <p:cNvPr id="3" name="Espace réservé du contenu 2">
+            <a:extLst>
+              <a:ext uri="{FF2B5EF4-FFF2-40B4-BE49-F238E27FC236}">
+                <a16:creationId xmlns:a16="http://schemas.microsoft.com/office/drawing/2014/main" id="{42D4C7D7-10D6-90D5-F71C-BC5DCD2CDB72}"/>
+              </a:ext>
+            </a:extLst>
+          </p:cNvPr>
+          <p:cNvSpPr>
+            <a:spLocks noGrp="1"/>
+          </p:cNvSpPr>
+          <p:nvPr>
+            <p:ph idx="1"/>
+          </p:nvPr>
+        </p:nvSpPr>
+        <p:spPr/>
+        <p:txBody>
+          <a:bodyPr/>
+          <a:lstStyle/>
+          <a:p>
+            <a:pPr marL="514350" indent="-514350">
+              <a:buFont typeface="+mj-lt"/>
+              <a:buAutoNum type="arabicPeriod"/>
+            </a:pPr>
+            <a:r>
+              <a:rPr lang="fr-CH" dirty="0"/>
+              <a:t>Connection du client</a:t>
+            </a:r>
+          </a:p>
+          <a:p>
+            <a:pPr marL="514350" indent="-514350">
+              <a:buFont typeface="+mj-lt"/>
+              <a:buAutoNum type="arabicPeriod"/>
+            </a:pPr>
+            <a:r>
+              <a:rPr lang="fr-CH" dirty="0"/>
+              <a:t>Négociation des algorithmes</a:t>
+            </a:r>
+          </a:p>
+          <a:p>
+            <a:pPr marL="514350" indent="-514350">
+              <a:buFont typeface="+mj-lt"/>
+              <a:buAutoNum type="arabicPeriod"/>
+            </a:pPr>
+            <a:r>
+              <a:rPr lang="fr-CH" dirty="0"/>
+              <a:t>Échange </a:t>
+            </a:r>
+            <a:r>
+              <a:rPr lang="fr-CH" dirty="0" err="1"/>
+              <a:t>Diffie</a:t>
+            </a:r>
+            <a:r>
+              <a:rPr lang="fr-CH" dirty="0"/>
+              <a:t>-Hellman</a:t>
+            </a:r>
+          </a:p>
+          <a:p>
+            <a:pPr marL="514350" indent="-514350">
+              <a:buFont typeface="+mj-lt"/>
+              <a:buAutoNum type="arabicPeriod"/>
+            </a:pPr>
+            <a:r>
+              <a:rPr lang="fr-CH" dirty="0"/>
+              <a:t>Le serveur </a:t>
+            </a:r>
+            <a:r>
+              <a:rPr lang="fr-CH" dirty="0">
+                <a:highlight>
+                  <a:srgbClr val="FF0000"/>
+                </a:highlight>
+              </a:rPr>
+              <a:t>signe le D-H</a:t>
+            </a:r>
+            <a:r>
+              <a:rPr lang="fr-CH" dirty="0"/>
+              <a:t>, les </a:t>
+            </a:r>
+            <a:r>
+              <a:rPr lang="fr-CH" dirty="0" err="1"/>
+              <a:t>cipher</a:t>
+            </a:r>
+            <a:r>
+              <a:rPr lang="fr-CH" dirty="0"/>
+              <a:t> suites, </a:t>
+            </a:r>
+            <a:r>
+              <a:rPr lang="fr-CH" dirty="0" err="1"/>
+              <a:t>l’id</a:t>
+            </a:r>
+            <a:r>
+              <a:rPr lang="fr-CH" dirty="0"/>
+              <a:t> client et serveur</a:t>
+            </a:r>
+          </a:p>
+          <a:p>
+            <a:pPr marL="514350" indent="-514350">
+              <a:buFont typeface="+mj-lt"/>
+              <a:buAutoNum type="arabicPeriod"/>
+            </a:pPr>
+            <a:r>
+              <a:rPr lang="fr-CH" dirty="0">
+                <a:highlight>
+                  <a:srgbClr val="FF0000"/>
+                </a:highlight>
+              </a:rPr>
+              <a:t>Signature envoyée en clair</a:t>
+            </a:r>
+          </a:p>
+          <a:p>
+            <a:pPr marL="514350" indent="-514350">
+              <a:buFont typeface="+mj-lt"/>
+              <a:buAutoNum type="arabicPeriod"/>
+            </a:pPr>
+            <a:r>
+              <a:rPr lang="fr-CH" dirty="0"/>
+              <a:t>Établissement du canal chiffré</a:t>
+            </a:r>
+          </a:p>
+          <a:p>
+            <a:pPr marL="514350" indent="-514350">
+              <a:buFont typeface="+mj-lt"/>
+              <a:buAutoNum type="arabicPeriod"/>
+            </a:pPr>
+            <a:r>
+              <a:rPr lang="fr-CH" dirty="0"/>
+              <a:t>Authentification du client</a:t>
+            </a:r>
+          </a:p>
+        </p:txBody>
+      </p:sp>
+    </p:spTree>
+    <p:extLst>
+      <p:ext uri="{BB962C8B-B14F-4D97-AF65-F5344CB8AC3E}">
+        <p14:creationId xmlns:p14="http://schemas.microsoft.com/office/powerpoint/2010/main" val="2788393243"/>
+      </p:ext>
+    </p:extLst>
+  </p:cSld>
+  <p:clrMapOvr>
+    <a:masterClrMapping/>
+  </p:clrMapOvr>
+</p:sld>
+</file>
+
+<file path=ppt/slides/slide11.xml><?xml version="1.0" encoding="utf-8"?>
+<p:sld xmlns:a="http://schemas.openxmlformats.org/drawingml/2006/main" xmlns:r="http://schemas.openxmlformats.org/officeDocument/2006/relationships" xmlns:p="http://schemas.openxmlformats.org/presentationml/2006/main">
+  <p:cSld>
+    <p:spTree>
+      <p:nvGrpSpPr>
+        <p:cNvPr id="1" name="">
+          <a:extLst>
+            <a:ext uri="{FF2B5EF4-FFF2-40B4-BE49-F238E27FC236}">
+              <a16:creationId xmlns:a16="http://schemas.microsoft.com/office/drawing/2014/main" id="{2A358365-71B6-3E17-2DED-41864C4E34F6}"/>
+            </a:ext>
+          </a:extLst>
+        </p:cNvPr>
+        <p:cNvGrpSpPr/>
+        <p:nvPr/>
+      </p:nvGrpSpPr>
+      <p:grpSpPr>
+        <a:xfrm>
+          <a:off x="0" y="0"/>
+          <a:ext cx="0" cy="0"/>
+          <a:chOff x="0" y="0"/>
+          <a:chExt cx="0" cy="0"/>
+        </a:xfrm>
+      </p:grpSpPr>
+      <p:sp>
+        <p:nvSpPr>
+          <p:cNvPr id="2" name="Titre 1">
+            <a:extLst>
+              <a:ext uri="{FF2B5EF4-FFF2-40B4-BE49-F238E27FC236}">
+                <a16:creationId xmlns:a16="http://schemas.microsoft.com/office/drawing/2014/main" id="{554B0484-BFF3-BBEC-9158-861CACD76F5A}"/>
+              </a:ext>
+            </a:extLst>
+          </p:cNvPr>
+          <p:cNvSpPr>
+            <a:spLocks noGrp="1"/>
+          </p:cNvSpPr>
+          <p:nvPr>
+            <p:ph type="title"/>
+          </p:nvPr>
+        </p:nvSpPr>
+        <p:spPr/>
+        <p:txBody>
+          <a:bodyPr/>
+          <a:lstStyle/>
+          <a:p>
+            <a:r>
+              <a:rPr lang="fr-CH" dirty="0"/>
+              <a:t>SSH - Authentification du client</a:t>
+            </a:r>
+          </a:p>
+        </p:txBody>
+      </p:sp>
+      <p:sp>
+        <p:nvSpPr>
+          <p:cNvPr id="3" name="Espace réservé du contenu 2">
+            <a:extLst>
+              <a:ext uri="{FF2B5EF4-FFF2-40B4-BE49-F238E27FC236}">
+                <a16:creationId xmlns:a16="http://schemas.microsoft.com/office/drawing/2014/main" id="{0E087414-4E46-A479-E2D6-0B07C1FC692C}"/>
+              </a:ext>
+            </a:extLst>
+          </p:cNvPr>
+          <p:cNvSpPr>
+            <a:spLocks noGrp="1"/>
+          </p:cNvSpPr>
+          <p:nvPr>
+            <p:ph idx="1"/>
+          </p:nvPr>
+        </p:nvSpPr>
+        <p:spPr/>
+        <p:txBody>
+          <a:bodyPr/>
+          <a:lstStyle/>
+          <a:p>
+            <a:r>
+              <a:rPr lang="fr-CH" dirty="0"/>
+              <a:t>Par mot de passe</a:t>
+            </a:r>
+          </a:p>
+          <a:p>
+            <a:pPr lvl="1"/>
+            <a:r>
+              <a:rPr lang="fr-CH" dirty="0"/>
+              <a:t>Mot de passe envoyé dans le canal chiffré</a:t>
+            </a:r>
+          </a:p>
+          <a:p>
+            <a:r>
+              <a:rPr lang="fr-CH" dirty="0"/>
+              <a:t>Par clé publique</a:t>
+            </a:r>
+          </a:p>
+          <a:p>
+            <a:pPr lvl="1"/>
+            <a:r>
+              <a:rPr lang="fr-CH" dirty="0"/>
+              <a:t>Le client signe l’identifiant de session</a:t>
+            </a:r>
+          </a:p>
+          <a:p>
+            <a:endParaRPr lang="fr-CH" dirty="0"/>
+          </a:p>
+        </p:txBody>
+      </p:sp>
+    </p:spTree>
+    <p:extLst>
+      <p:ext uri="{BB962C8B-B14F-4D97-AF65-F5344CB8AC3E}">
+        <p14:creationId xmlns:p14="http://schemas.microsoft.com/office/powerpoint/2010/main" val="1770220696"/>
+      </p:ext>
+    </p:extLst>
+  </p:cSld>
+  <p:clrMapOvr>
+    <a:masterClrMapping/>
+  </p:clrMapOvr>
+</p:sld>
+</file>
+
+<file path=ppt/slides/slide12.xml><?xml version="1.0" encoding="utf-8"?>
+<p:sld xmlns:a="http://schemas.openxmlformats.org/drawingml/2006/main" xmlns:r="http://schemas.openxmlformats.org/officeDocument/2006/relationships" xmlns:p="http://schemas.openxmlformats.org/presentationml/2006/main">
+  <p:cSld>
+    <p:spTree>
+      <p:nvGrpSpPr>
+        <p:cNvPr id="1" name="">
+          <a:extLst>
+            <a:ext uri="{FF2B5EF4-FFF2-40B4-BE49-F238E27FC236}">
+              <a16:creationId xmlns:a16="http://schemas.microsoft.com/office/drawing/2014/main" id="{64503590-0CF4-EEDD-8A0D-E4382E745E15}"/>
+            </a:ext>
+          </a:extLst>
+        </p:cNvPr>
+        <p:cNvGrpSpPr/>
+        <p:nvPr/>
+      </p:nvGrpSpPr>
+      <p:grpSpPr>
+        <a:xfrm>
+          <a:off x="0" y="0"/>
+          <a:ext cx="0" cy="0"/>
+          <a:chOff x="0" y="0"/>
+          <a:chExt cx="0" cy="0"/>
+        </a:xfrm>
+      </p:grpSpPr>
+      <p:sp>
+        <p:nvSpPr>
+          <p:cNvPr id="2" name="Titre 1">
+            <a:extLst>
+              <a:ext uri="{FF2B5EF4-FFF2-40B4-BE49-F238E27FC236}">
+                <a16:creationId xmlns:a16="http://schemas.microsoft.com/office/drawing/2014/main" id="{FF110354-8EE4-2F91-51C4-7F200A1AEBBB}"/>
+              </a:ext>
+            </a:extLst>
+          </p:cNvPr>
+          <p:cNvSpPr>
+            <a:spLocks noGrp="1"/>
+          </p:cNvSpPr>
+          <p:nvPr>
+            <p:ph type="title"/>
+          </p:nvPr>
+        </p:nvSpPr>
+        <p:spPr/>
+        <p:txBody>
+          <a:bodyPr/>
+          <a:lstStyle/>
+          <a:p>
+            <a:r>
+              <a:rPr lang="fr-CH" dirty="0"/>
+              <a:t>SSH - Algorithmes</a:t>
+            </a:r>
+          </a:p>
+        </p:txBody>
+      </p:sp>
+      <p:sp>
+        <p:nvSpPr>
+          <p:cNvPr id="3" name="Espace réservé du contenu 2">
+            <a:extLst>
+              <a:ext uri="{FF2B5EF4-FFF2-40B4-BE49-F238E27FC236}">
+                <a16:creationId xmlns:a16="http://schemas.microsoft.com/office/drawing/2014/main" id="{749DA74E-0EF4-F4F2-93CA-D49F893029A6}"/>
+              </a:ext>
+            </a:extLst>
+          </p:cNvPr>
+          <p:cNvSpPr>
+            <a:spLocks noGrp="1"/>
+          </p:cNvSpPr>
+          <p:nvPr>
+            <p:ph idx="1"/>
+          </p:nvPr>
+        </p:nvSpPr>
+        <p:spPr/>
+        <p:txBody>
+          <a:bodyPr/>
+          <a:lstStyle/>
+          <a:p>
+            <a:r>
+              <a:rPr lang="fr-CH" dirty="0"/>
+              <a:t>Échange des clés :</a:t>
+            </a:r>
+          </a:p>
+          <a:p>
+            <a:pPr lvl="1"/>
+            <a:r>
+              <a:rPr lang="fr-CH" dirty="0"/>
+              <a:t>D-H</a:t>
+            </a:r>
+          </a:p>
+          <a:p>
+            <a:pPr lvl="1"/>
+            <a:r>
+              <a:rPr lang="fr-CH" dirty="0"/>
+              <a:t>ECDH</a:t>
+            </a:r>
+          </a:p>
+          <a:p>
+            <a:pPr lvl="1"/>
+            <a:r>
+              <a:rPr lang="fr-CH" dirty="0"/>
+              <a:t>RSA</a:t>
+            </a:r>
+          </a:p>
+          <a:p>
+            <a:r>
+              <a:rPr lang="fr-CH" dirty="0"/>
+              <a:t>Signatures</a:t>
+            </a:r>
+          </a:p>
+          <a:p>
+            <a:pPr lvl="1"/>
+            <a:r>
+              <a:rPr lang="fr-CH" dirty="0"/>
+              <a:t>DSA</a:t>
+            </a:r>
+          </a:p>
+          <a:p>
+            <a:pPr lvl="1"/>
+            <a:r>
+              <a:rPr lang="fr-CH" dirty="0"/>
+              <a:t>RSA</a:t>
+            </a:r>
+          </a:p>
+          <a:p>
+            <a:pPr lvl="1"/>
+            <a:r>
+              <a:rPr lang="fr-CH" dirty="0"/>
+              <a:t>ECDSA</a:t>
+            </a:r>
+          </a:p>
+          <a:p>
+            <a:pPr lvl="1"/>
+            <a:r>
+              <a:rPr lang="fr-CH" dirty="0" err="1"/>
+              <a:t>EdDSA</a:t>
+            </a:r>
+            <a:r>
+              <a:rPr lang="fr-CH" dirty="0"/>
+              <a:t> (Ed25519)</a:t>
+            </a:r>
+          </a:p>
+        </p:txBody>
+      </p:sp>
+    </p:spTree>
+    <p:extLst>
+      <p:ext uri="{BB962C8B-B14F-4D97-AF65-F5344CB8AC3E}">
+        <p14:creationId xmlns:p14="http://schemas.microsoft.com/office/powerpoint/2010/main" val="3258015085"/>
+      </p:ext>
+    </p:extLst>
+  </p:cSld>
+  <p:clrMapOvr>
+    <a:masterClrMapping/>
+  </p:clrMapOvr>
+</p:sld>
+</file>
+
+<file path=ppt/slides/slide13.xml><?xml version="1.0" encoding="utf-8"?>
+<p:sld xmlns:a="http://schemas.openxmlformats.org/drawingml/2006/main" xmlns:r="http://schemas.openxmlformats.org/officeDocument/2006/relationships" xmlns:p="http://schemas.openxmlformats.org/presentationml/2006/main">
+  <p:cSld>
+    <p:spTree>
+      <p:nvGrpSpPr>
+        <p:cNvPr id="1" name=""/>
+        <p:cNvGrpSpPr/>
+        <p:nvPr/>
+      </p:nvGrpSpPr>
+      <p:grpSpPr>
+        <a:xfrm>
+          <a:off x="0" y="0"/>
+          <a:ext cx="0" cy="0"/>
+          <a:chOff x="0" y="0"/>
+          <a:chExt cx="0" cy="0"/>
+        </a:xfrm>
+      </p:grpSpPr>
+      <p:sp>
+        <p:nvSpPr>
+          <p:cNvPr id="2" name="Titre 1">
+            <a:extLst>
+              <a:ext uri="{FF2B5EF4-FFF2-40B4-BE49-F238E27FC236}">
+                <a16:creationId xmlns:a16="http://schemas.microsoft.com/office/drawing/2014/main" id="{DA51DFA0-5BE4-B64A-0E12-60C67E03E6AE}"/>
+              </a:ext>
+            </a:extLst>
+          </p:cNvPr>
+          <p:cNvSpPr>
+            <a:spLocks noGrp="1"/>
+          </p:cNvSpPr>
+          <p:nvPr>
+            <p:ph type="title"/>
+          </p:nvPr>
+        </p:nvSpPr>
+        <p:spPr/>
+        <p:txBody>
+          <a:bodyPr/>
+          <a:lstStyle/>
+          <a:p>
+            <a:r>
+              <a:rPr lang="fr-CH" dirty="0"/>
+              <a:t>SSH – Compromission clé de signature</a:t>
+            </a:r>
+          </a:p>
+        </p:txBody>
+      </p:sp>
+      <p:sp>
+        <p:nvSpPr>
+          <p:cNvPr id="3" name="Espace réservé du contenu 2">
+            <a:extLst>
+              <a:ext uri="{FF2B5EF4-FFF2-40B4-BE49-F238E27FC236}">
+                <a16:creationId xmlns:a16="http://schemas.microsoft.com/office/drawing/2014/main" id="{CFA80786-5026-3D96-B0CB-131D9BA62B60}"/>
+              </a:ext>
+            </a:extLst>
+          </p:cNvPr>
+          <p:cNvSpPr>
+            <a:spLocks noGrp="1"/>
+          </p:cNvSpPr>
+          <p:nvPr>
+            <p:ph idx="1"/>
+          </p:nvPr>
+        </p:nvSpPr>
+        <p:spPr/>
+        <p:txBody>
+          <a:bodyPr/>
+          <a:lstStyle/>
+          <a:p>
+            <a:r>
+              <a:rPr lang="fr-CH" dirty="0"/>
+              <a:t>Attaques passives :</a:t>
+            </a:r>
+          </a:p>
+          <a:p>
+            <a:pPr lvl="1"/>
+            <a:r>
+              <a:rPr lang="fr-CH" dirty="0"/>
+              <a:t>-</a:t>
+            </a:r>
+          </a:p>
+          <a:p>
+            <a:r>
+              <a:rPr lang="fr-CH" dirty="0"/>
+              <a:t>Attaques actives</a:t>
+            </a:r>
+          </a:p>
+          <a:p>
+            <a:pPr lvl="1"/>
+            <a:r>
+              <a:rPr lang="fr-CH" dirty="0"/>
+              <a:t>Usurper l’identité du serveur</a:t>
+            </a:r>
+          </a:p>
+          <a:p>
+            <a:pPr lvl="1"/>
+            <a:r>
+              <a:rPr lang="fr-CH" dirty="0"/>
+              <a:t>Récupérer le mot de passe du client</a:t>
+            </a:r>
+          </a:p>
+          <a:p>
+            <a:pPr lvl="1"/>
+            <a:r>
+              <a:rPr lang="fr-CH" dirty="0"/>
+              <a:t>Man-in-the-Middle possible uniquement si authentification du client par mot de passe</a:t>
+            </a:r>
+          </a:p>
+          <a:p>
+            <a:pPr lvl="1"/>
+            <a:r>
+              <a:rPr lang="fr-CH" dirty="0"/>
+              <a:t>Récupérer les commandes envoyées par le client</a:t>
+            </a:r>
+          </a:p>
+        </p:txBody>
+      </p:sp>
+    </p:spTree>
+    <p:extLst>
+      <p:ext uri="{BB962C8B-B14F-4D97-AF65-F5344CB8AC3E}">
+        <p14:creationId xmlns:p14="http://schemas.microsoft.com/office/powerpoint/2010/main" val="2092251775"/>
+      </p:ext>
+    </p:extLst>
+  </p:cSld>
+  <p:clrMapOvr>
+    <a:masterClrMapping/>
+  </p:clrMapOvr>
+</p:sld>
+</file>
+
+<file path=ppt/slides/slide14.xml><?xml version="1.0" encoding="utf-8"?>
+<p:sld xmlns:a="http://schemas.openxmlformats.org/drawingml/2006/main" xmlns:r="http://schemas.openxmlformats.org/officeDocument/2006/relationships" xmlns:p="http://schemas.openxmlformats.org/presentationml/2006/main">
+  <p:cSld>
+    <p:spTree>
+      <p:nvGrpSpPr>
+        <p:cNvPr id="1" name=""/>
+        <p:cNvGrpSpPr/>
+        <p:nvPr/>
+      </p:nvGrpSpPr>
+      <p:grpSpPr>
+        <a:xfrm>
+          <a:off x="0" y="0"/>
+          <a:ext cx="0" cy="0"/>
+          <a:chOff x="0" y="0"/>
+          <a:chExt cx="0" cy="0"/>
+        </a:xfrm>
+      </p:grpSpPr>
+      <p:sp>
+        <p:nvSpPr>
+          <p:cNvPr id="2" name="Titre 1">
+            <a:extLst>
+              <a:ext uri="{FF2B5EF4-FFF2-40B4-BE49-F238E27FC236}">
+                <a16:creationId xmlns:a16="http://schemas.microsoft.com/office/drawing/2014/main" id="{C7AA97B4-9548-A3E1-F52D-BD36A09A7DA0}"/>
+              </a:ext>
+            </a:extLst>
+          </p:cNvPr>
+          <p:cNvSpPr>
+            <a:spLocks noGrp="1"/>
+          </p:cNvSpPr>
+          <p:nvPr>
+            <p:ph type="title"/>
+          </p:nvPr>
+        </p:nvSpPr>
+        <p:spPr/>
+        <p:txBody>
+          <a:bodyPr/>
+          <a:lstStyle/>
+          <a:p>
+            <a:r>
+              <a:rPr lang="fr-CH" dirty="0" err="1"/>
+              <a:t>IPsec</a:t>
+            </a:r>
+            <a:endParaRPr lang="fr-CH" dirty="0"/>
+          </a:p>
+        </p:txBody>
+      </p:sp>
+      <p:sp>
+        <p:nvSpPr>
+          <p:cNvPr id="3" name="Espace réservé du contenu 2">
+            <a:extLst>
+              <a:ext uri="{FF2B5EF4-FFF2-40B4-BE49-F238E27FC236}">
+                <a16:creationId xmlns:a16="http://schemas.microsoft.com/office/drawing/2014/main" id="{F0C10A8F-80FA-2A40-2959-EAF69F97A569}"/>
+              </a:ext>
+            </a:extLst>
+          </p:cNvPr>
+          <p:cNvSpPr>
+            <a:spLocks noGrp="1"/>
+          </p:cNvSpPr>
+          <p:nvPr>
+            <p:ph idx="1"/>
+          </p:nvPr>
+        </p:nvSpPr>
+        <p:spPr/>
+        <p:txBody>
+          <a:bodyPr/>
+          <a:lstStyle/>
+          <a:p>
+            <a:r>
+              <a:rPr lang="fr-CH" dirty="0"/>
+              <a:t>Principalement utilisé par des </a:t>
+            </a:r>
+            <a:r>
+              <a:rPr lang="fr-CH" dirty="0" err="1"/>
+              <a:t>VPNs</a:t>
+            </a:r>
+            <a:endParaRPr lang="fr-CH" dirty="0"/>
+          </a:p>
+          <a:p>
+            <a:r>
+              <a:rPr lang="fr-CH" dirty="0"/>
+              <a:t>2 versions majeures :</a:t>
+            </a:r>
+          </a:p>
+          <a:p>
+            <a:pPr lvl="1"/>
+            <a:r>
+              <a:rPr lang="fr-CH" dirty="0"/>
+              <a:t>IKEv1</a:t>
+            </a:r>
+          </a:p>
+          <a:p>
+            <a:pPr lvl="1"/>
+            <a:r>
+              <a:rPr lang="fr-CH" dirty="0"/>
+              <a:t>IKEv2</a:t>
+            </a:r>
+          </a:p>
+        </p:txBody>
+      </p:sp>
+    </p:spTree>
+    <p:extLst>
+      <p:ext uri="{BB962C8B-B14F-4D97-AF65-F5344CB8AC3E}">
+        <p14:creationId xmlns:p14="http://schemas.microsoft.com/office/powerpoint/2010/main" val="1917608397"/>
+      </p:ext>
+    </p:extLst>
+  </p:cSld>
+  <p:clrMapOvr>
+    <a:masterClrMapping/>
+  </p:clrMapOvr>
+</p:sld>
+</file>
+
+<file path=ppt/slides/slide15.xml><?xml version="1.0" encoding="utf-8"?>
+<p:sld xmlns:a="http://schemas.openxmlformats.org/drawingml/2006/main" xmlns:r="http://schemas.openxmlformats.org/officeDocument/2006/relationships" xmlns:p="http://schemas.openxmlformats.org/presentationml/2006/main">
+  <p:cSld>
+    <p:spTree>
+      <p:nvGrpSpPr>
+        <p:cNvPr id="1" name="">
+          <a:extLst>
+            <a:ext uri="{FF2B5EF4-FFF2-40B4-BE49-F238E27FC236}">
+              <a16:creationId xmlns:a16="http://schemas.microsoft.com/office/drawing/2014/main" id="{6D2040AB-2BD3-B0CE-D91C-46F12A498B9C}"/>
+            </a:ext>
+          </a:extLst>
+        </p:cNvPr>
+        <p:cNvGrpSpPr/>
+        <p:nvPr/>
+      </p:nvGrpSpPr>
+      <p:grpSpPr>
+        <a:xfrm>
+          <a:off x="0" y="0"/>
+          <a:ext cx="0" cy="0"/>
+          <a:chOff x="0" y="0"/>
+          <a:chExt cx="0" cy="0"/>
+        </a:xfrm>
+      </p:grpSpPr>
+      <p:sp>
+        <p:nvSpPr>
+          <p:cNvPr id="2" name="Titre 1">
+            <a:extLst>
+              <a:ext uri="{FF2B5EF4-FFF2-40B4-BE49-F238E27FC236}">
+                <a16:creationId xmlns:a16="http://schemas.microsoft.com/office/drawing/2014/main" id="{5312BF64-4E12-1ECF-5F0C-B5373F5BA825}"/>
+              </a:ext>
+            </a:extLst>
+          </p:cNvPr>
+          <p:cNvSpPr>
+            <a:spLocks noGrp="1"/>
+          </p:cNvSpPr>
+          <p:nvPr>
+            <p:ph type="title"/>
+          </p:nvPr>
+        </p:nvSpPr>
+        <p:spPr/>
+        <p:txBody>
+          <a:bodyPr/>
+          <a:lstStyle/>
+          <a:p>
+            <a:r>
+              <a:rPr lang="fr-CH"/>
+              <a:t>IPsec </a:t>
+            </a:r>
+            <a:r>
+              <a:rPr lang="fr-CH" dirty="0"/>
+              <a:t>- IKEv1</a:t>
+            </a:r>
+          </a:p>
+        </p:txBody>
+      </p:sp>
+      <p:sp>
+        <p:nvSpPr>
+          <p:cNvPr id="3" name="Espace réservé du contenu 2">
+            <a:extLst>
+              <a:ext uri="{FF2B5EF4-FFF2-40B4-BE49-F238E27FC236}">
+                <a16:creationId xmlns:a16="http://schemas.microsoft.com/office/drawing/2014/main" id="{C469015B-765E-AFB0-0247-5D8AD6366ABB}"/>
+              </a:ext>
+            </a:extLst>
+          </p:cNvPr>
+          <p:cNvSpPr>
+            <a:spLocks noGrp="1"/>
+          </p:cNvSpPr>
+          <p:nvPr>
+            <p:ph idx="1"/>
+          </p:nvPr>
+        </p:nvSpPr>
+        <p:spPr/>
+        <p:txBody>
+          <a:bodyPr/>
+          <a:lstStyle/>
+          <a:p>
+            <a:r>
+              <a:rPr lang="fr-CH" dirty="0"/>
+              <a:t>Authentification :</a:t>
+            </a:r>
+          </a:p>
+          <a:p>
+            <a:pPr lvl="1"/>
+            <a:r>
+              <a:rPr lang="fr-CH" dirty="0"/>
+              <a:t>Signatures digitales</a:t>
+            </a:r>
+          </a:p>
+          <a:p>
+            <a:pPr lvl="1"/>
+            <a:r>
+              <a:rPr lang="fr-CH" dirty="0"/>
+              <a:t>Chiffrement par clés publiques</a:t>
+            </a:r>
+          </a:p>
+          <a:p>
+            <a:pPr lvl="1"/>
+            <a:r>
+              <a:rPr lang="fr-CH" dirty="0"/>
+              <a:t>Clés pré-partagées (PSK)</a:t>
+            </a:r>
+          </a:p>
+          <a:p>
+            <a:r>
+              <a:rPr lang="fr-CH" dirty="0"/>
+              <a:t>Modes :</a:t>
+            </a:r>
+          </a:p>
+          <a:p>
+            <a:pPr lvl="1"/>
+            <a:r>
+              <a:rPr lang="fr-CH" dirty="0"/>
+              <a:t>Main mode</a:t>
+            </a:r>
+          </a:p>
+          <a:p>
+            <a:pPr lvl="1"/>
+            <a:r>
+              <a:rPr lang="fr-CH" dirty="0"/>
+              <a:t>Agressive mode : échange initial réduit mais moins sécurisé</a:t>
+            </a:r>
+          </a:p>
+        </p:txBody>
+      </p:sp>
+    </p:spTree>
+    <p:extLst>
+      <p:ext uri="{BB962C8B-B14F-4D97-AF65-F5344CB8AC3E}">
+        <p14:creationId xmlns:p14="http://schemas.microsoft.com/office/powerpoint/2010/main" val="661327400"/>
+      </p:ext>
+    </p:extLst>
+  </p:cSld>
+  <p:clrMapOvr>
+    <a:masterClrMapping/>
+  </p:clrMapOvr>
+</p:sld>
+</file>
+
+<file path=ppt/slides/slide16.xml><?xml version="1.0" encoding="utf-8"?>
+<p:sld xmlns:a="http://schemas.openxmlformats.org/drawingml/2006/main" xmlns:r="http://schemas.openxmlformats.org/officeDocument/2006/relationships" xmlns:p="http://schemas.openxmlformats.org/presentationml/2006/main">
+  <p:cSld>
+    <p:spTree>
+      <p:nvGrpSpPr>
+        <p:cNvPr id="1" name="">
+          <a:extLst>
+            <a:ext uri="{FF2B5EF4-FFF2-40B4-BE49-F238E27FC236}">
+              <a16:creationId xmlns:a16="http://schemas.microsoft.com/office/drawing/2014/main" id="{F1ABBC71-2476-E748-ED93-198E9E44302A}"/>
+            </a:ext>
+          </a:extLst>
+        </p:cNvPr>
+        <p:cNvGrpSpPr/>
+        <p:nvPr/>
+      </p:nvGrpSpPr>
+      <p:grpSpPr>
+        <a:xfrm>
+          <a:off x="0" y="0"/>
+          <a:ext cx="0" cy="0"/>
+          <a:chOff x="0" y="0"/>
+          <a:chExt cx="0" cy="0"/>
+        </a:xfrm>
+      </p:grpSpPr>
+      <p:sp>
+        <p:nvSpPr>
+          <p:cNvPr id="2" name="Titre 1">
+            <a:extLst>
+              <a:ext uri="{FF2B5EF4-FFF2-40B4-BE49-F238E27FC236}">
+                <a16:creationId xmlns:a16="http://schemas.microsoft.com/office/drawing/2014/main" id="{049D2312-4EC6-83AD-B83A-F54607CB2106}"/>
+              </a:ext>
+            </a:extLst>
+          </p:cNvPr>
+          <p:cNvSpPr>
+            <a:spLocks noGrp="1"/>
+          </p:cNvSpPr>
+          <p:nvPr>
+            <p:ph type="title"/>
+          </p:nvPr>
+        </p:nvSpPr>
+        <p:spPr/>
+        <p:txBody>
+          <a:bodyPr/>
+          <a:lstStyle/>
+          <a:p>
+            <a:r>
+              <a:rPr lang="fr-CH" dirty="0" err="1"/>
+              <a:t>IPsec</a:t>
+            </a:r>
+            <a:r>
+              <a:rPr lang="fr-CH" dirty="0"/>
+              <a:t> - IKEv1 – Implications de sécurité</a:t>
+            </a:r>
+          </a:p>
+        </p:txBody>
+      </p:sp>
+      <p:sp>
+        <p:nvSpPr>
+          <p:cNvPr id="3" name="Espace réservé du contenu 2">
+            <a:extLst>
+              <a:ext uri="{FF2B5EF4-FFF2-40B4-BE49-F238E27FC236}">
+                <a16:creationId xmlns:a16="http://schemas.microsoft.com/office/drawing/2014/main" id="{81728DB1-5BAF-7A7B-640A-613E78402327}"/>
+              </a:ext>
+            </a:extLst>
+          </p:cNvPr>
+          <p:cNvSpPr>
+            <a:spLocks noGrp="1"/>
+          </p:cNvSpPr>
+          <p:nvPr>
+            <p:ph idx="1"/>
+          </p:nvPr>
+        </p:nvSpPr>
+        <p:spPr/>
+        <p:txBody>
+          <a:bodyPr/>
+          <a:lstStyle/>
+          <a:p>
+            <a:r>
+              <a:rPr lang="fr-CH" dirty="0"/>
+              <a:t>Agressive mode : écoute passive pour récupérer la signature en clair</a:t>
+            </a:r>
+          </a:p>
+          <a:p>
+            <a:r>
+              <a:rPr lang="fr-CH" dirty="0"/>
+              <a:t>Compromission de la clé de signature :</a:t>
+            </a:r>
+          </a:p>
+          <a:p>
+            <a:pPr lvl="1"/>
+            <a:r>
+              <a:rPr lang="fr-CH" dirty="0"/>
+              <a:t>Usurpation de l’identité</a:t>
+            </a:r>
+          </a:p>
+          <a:p>
+            <a:pPr lvl="1"/>
+            <a:r>
+              <a:rPr lang="fr-CH" dirty="0"/>
+              <a:t>Man-in-the-Middle complet impossible (signature-</a:t>
+            </a:r>
+            <a:r>
+              <a:rPr lang="fr-CH" dirty="0" err="1"/>
+              <a:t>based</a:t>
+            </a:r>
+            <a:r>
+              <a:rPr lang="fr-CH" dirty="0"/>
+              <a:t> </a:t>
+            </a:r>
+            <a:r>
+              <a:rPr lang="fr-CH" dirty="0" err="1"/>
+              <a:t>auth</a:t>
+            </a:r>
+            <a:r>
+              <a:rPr lang="fr-CH" dirty="0"/>
+              <a:t>)</a:t>
+            </a:r>
+          </a:p>
+        </p:txBody>
+      </p:sp>
+    </p:spTree>
+    <p:extLst>
+      <p:ext uri="{BB962C8B-B14F-4D97-AF65-F5344CB8AC3E}">
+        <p14:creationId xmlns:p14="http://schemas.microsoft.com/office/powerpoint/2010/main" val="4079882357"/>
+      </p:ext>
+    </p:extLst>
+  </p:cSld>
+  <p:clrMapOvr>
+    <a:masterClrMapping/>
+  </p:clrMapOvr>
+</p:sld>
+</file>
+
+<file path=ppt/slides/slide17.xml><?xml version="1.0" encoding="utf-8"?>
+<p:sld xmlns:a="http://schemas.openxmlformats.org/drawingml/2006/main" xmlns:r="http://schemas.openxmlformats.org/officeDocument/2006/relationships" xmlns:p="http://schemas.openxmlformats.org/presentationml/2006/main">
+  <p:cSld>
+    <p:spTree>
+      <p:nvGrpSpPr>
+        <p:cNvPr id="1" name="">
+          <a:extLst>
+            <a:ext uri="{FF2B5EF4-FFF2-40B4-BE49-F238E27FC236}">
+              <a16:creationId xmlns:a16="http://schemas.microsoft.com/office/drawing/2014/main" id="{E4E5832C-DE32-66CD-EF25-EA5277CC09EA}"/>
+            </a:ext>
+          </a:extLst>
+        </p:cNvPr>
+        <p:cNvGrpSpPr/>
+        <p:nvPr/>
+      </p:nvGrpSpPr>
+      <p:grpSpPr>
+        <a:xfrm>
+          <a:off x="0" y="0"/>
+          <a:ext cx="0" cy="0"/>
+          <a:chOff x="0" y="0"/>
+          <a:chExt cx="0" cy="0"/>
+        </a:xfrm>
+      </p:grpSpPr>
+      <p:sp>
+        <p:nvSpPr>
+          <p:cNvPr id="2" name="Titre 1">
+            <a:extLst>
+              <a:ext uri="{FF2B5EF4-FFF2-40B4-BE49-F238E27FC236}">
+                <a16:creationId xmlns:a16="http://schemas.microsoft.com/office/drawing/2014/main" id="{97B0B466-1442-A06F-6363-6EEB1F93D4B5}"/>
+              </a:ext>
+            </a:extLst>
+          </p:cNvPr>
+          <p:cNvSpPr>
+            <a:spLocks noGrp="1"/>
+          </p:cNvSpPr>
+          <p:nvPr>
+            <p:ph type="title"/>
+          </p:nvPr>
+        </p:nvSpPr>
+        <p:spPr/>
+        <p:txBody>
+          <a:bodyPr/>
+          <a:lstStyle/>
+          <a:p>
+            <a:r>
+              <a:rPr lang="fr-CH" dirty="0" err="1"/>
+              <a:t>IPsec</a:t>
+            </a:r>
+            <a:r>
+              <a:rPr lang="fr-CH" dirty="0"/>
+              <a:t> – IKEv2</a:t>
+            </a:r>
+          </a:p>
+        </p:txBody>
+      </p:sp>
+      <p:sp>
+        <p:nvSpPr>
+          <p:cNvPr id="3" name="Espace réservé du contenu 2">
+            <a:extLst>
+              <a:ext uri="{FF2B5EF4-FFF2-40B4-BE49-F238E27FC236}">
+                <a16:creationId xmlns:a16="http://schemas.microsoft.com/office/drawing/2014/main" id="{DA90C8BF-B57B-E89B-CA72-792961F9445E}"/>
+              </a:ext>
+            </a:extLst>
+          </p:cNvPr>
+          <p:cNvSpPr>
+            <a:spLocks noGrp="1"/>
+          </p:cNvSpPr>
+          <p:nvPr>
+            <p:ph idx="1"/>
+          </p:nvPr>
+        </p:nvSpPr>
+        <p:spPr/>
+        <p:txBody>
+          <a:bodyPr/>
+          <a:lstStyle/>
+          <a:p>
+            <a:r>
+              <a:rPr lang="fr-CH" dirty="0"/>
+              <a:t>Pas compatible avec IKEv1</a:t>
+            </a:r>
+          </a:p>
+          <a:p>
+            <a:r>
+              <a:rPr lang="fr-CH" dirty="0"/>
+              <a:t>Toutes les signatures sont chiffrées</a:t>
+            </a:r>
+          </a:p>
+          <a:p>
+            <a:r>
+              <a:rPr lang="fr-CH" dirty="0"/>
+              <a:t>Extensible </a:t>
+            </a:r>
+            <a:r>
+              <a:rPr lang="fr-CH" dirty="0" err="1"/>
+              <a:t>Authentication</a:t>
+            </a:r>
+            <a:r>
+              <a:rPr lang="fr-CH" dirty="0"/>
+              <a:t> Protocol (EAP) pour obtenir une signature du serveur sans s’authentifier</a:t>
+            </a:r>
+          </a:p>
+        </p:txBody>
+      </p:sp>
+    </p:spTree>
+    <p:extLst>
+      <p:ext uri="{BB962C8B-B14F-4D97-AF65-F5344CB8AC3E}">
+        <p14:creationId xmlns:p14="http://schemas.microsoft.com/office/powerpoint/2010/main" val="2209425221"/>
+      </p:ext>
+    </p:extLst>
+  </p:cSld>
+  <p:clrMapOvr>
+    <a:masterClrMapping/>
+  </p:clrMapOvr>
+</p:sld>
+</file>
+
+<file path=ppt/slides/slide18.xml><?xml version="1.0" encoding="utf-8"?>
+<p:sld xmlns:a="http://schemas.openxmlformats.org/drawingml/2006/main" xmlns:r="http://schemas.openxmlformats.org/officeDocument/2006/relationships" xmlns:p="http://schemas.openxmlformats.org/presentationml/2006/main">
+  <p:cSld>
+    <p:spTree>
+      <p:nvGrpSpPr>
+        <p:cNvPr id="1" name="">
+          <a:extLst>
+            <a:ext uri="{FF2B5EF4-FFF2-40B4-BE49-F238E27FC236}">
+              <a16:creationId xmlns:a16="http://schemas.microsoft.com/office/drawing/2014/main" id="{AB54CD5B-45FC-9C7E-F5AB-EE598846E620}"/>
+            </a:ext>
+          </a:extLst>
+        </p:cNvPr>
+        <p:cNvGrpSpPr/>
+        <p:nvPr/>
+      </p:nvGrpSpPr>
+      <p:grpSpPr>
+        <a:xfrm>
+          <a:off x="0" y="0"/>
+          <a:ext cx="0" cy="0"/>
+          <a:chOff x="0" y="0"/>
+          <a:chExt cx="0" cy="0"/>
+        </a:xfrm>
+      </p:grpSpPr>
+      <p:sp>
+        <p:nvSpPr>
+          <p:cNvPr id="2" name="Titre 1">
+            <a:extLst>
+              <a:ext uri="{FF2B5EF4-FFF2-40B4-BE49-F238E27FC236}">
+                <a16:creationId xmlns:a16="http://schemas.microsoft.com/office/drawing/2014/main" id="{99CD9B76-B63B-62F5-3D5C-FB3604ECAE5F}"/>
+              </a:ext>
+            </a:extLst>
+          </p:cNvPr>
+          <p:cNvSpPr>
+            <a:spLocks noGrp="1"/>
+          </p:cNvSpPr>
+          <p:nvPr>
+            <p:ph type="title"/>
+          </p:nvPr>
+        </p:nvSpPr>
+        <p:spPr/>
+        <p:txBody>
+          <a:bodyPr/>
+          <a:lstStyle/>
+          <a:p>
+            <a:r>
+              <a:rPr lang="fr-CH" dirty="0" err="1"/>
+              <a:t>IPsec</a:t>
+            </a:r>
+            <a:r>
+              <a:rPr lang="fr-CH" dirty="0"/>
+              <a:t> – IKEv2 – Implications de sécurité</a:t>
+            </a:r>
+          </a:p>
+        </p:txBody>
+      </p:sp>
+      <p:sp>
+        <p:nvSpPr>
+          <p:cNvPr id="3" name="Espace réservé du contenu 2">
+            <a:extLst>
+              <a:ext uri="{FF2B5EF4-FFF2-40B4-BE49-F238E27FC236}">
+                <a16:creationId xmlns:a16="http://schemas.microsoft.com/office/drawing/2014/main" id="{7A16AF26-D384-DF31-BACC-C1AC80005220}"/>
+              </a:ext>
+            </a:extLst>
+          </p:cNvPr>
+          <p:cNvSpPr>
+            <a:spLocks noGrp="1"/>
+          </p:cNvSpPr>
+          <p:nvPr>
+            <p:ph idx="1"/>
+          </p:nvPr>
+        </p:nvSpPr>
+        <p:spPr/>
+        <p:txBody>
+          <a:bodyPr/>
+          <a:lstStyle/>
+          <a:p>
+            <a:r>
+              <a:rPr lang="fr-CH" dirty="0"/>
+              <a:t>Attaque active nécessaire pour récupérer des signatures</a:t>
+            </a:r>
+          </a:p>
+          <a:p>
+            <a:r>
+              <a:rPr lang="fr-CH" dirty="0"/>
+              <a:t>Compromission de la clé de signature : ???</a:t>
+            </a:r>
+          </a:p>
+          <a:p>
+            <a:pPr lvl="1"/>
+            <a:r>
+              <a:rPr lang="fr-CH" dirty="0"/>
+              <a:t>Usurpation de l’identité</a:t>
+            </a:r>
+          </a:p>
+          <a:p>
+            <a:pPr lvl="1"/>
+            <a:r>
+              <a:rPr lang="fr-CH" dirty="0"/>
+              <a:t>Man-in-the-Middle complet impossible (signature-</a:t>
+            </a:r>
+            <a:r>
+              <a:rPr lang="fr-CH" dirty="0" err="1"/>
+              <a:t>based</a:t>
+            </a:r>
+            <a:r>
+              <a:rPr lang="fr-CH" dirty="0"/>
+              <a:t> </a:t>
+            </a:r>
+            <a:r>
+              <a:rPr lang="fr-CH" dirty="0" err="1"/>
+              <a:t>auth</a:t>
+            </a:r>
+            <a:r>
+              <a:rPr lang="fr-CH" dirty="0"/>
+              <a:t>)</a:t>
+            </a:r>
+          </a:p>
+        </p:txBody>
+      </p:sp>
+    </p:spTree>
+    <p:extLst>
+      <p:ext uri="{BB962C8B-B14F-4D97-AF65-F5344CB8AC3E}">
+        <p14:creationId xmlns:p14="http://schemas.microsoft.com/office/powerpoint/2010/main" val="3828468668"/>
+      </p:ext>
+    </p:extLst>
+  </p:cSld>
+  <p:clrMapOvr>
+    <a:masterClrMapping/>
+  </p:clrMapOvr>
+</p:sld>
+</file>
+
+<file path=ppt/slides/slide19.xml><?xml version="1.0" encoding="utf-8"?>
+<p:sld xmlns:a="http://schemas.openxmlformats.org/drawingml/2006/main" xmlns:r="http://schemas.openxmlformats.org/officeDocument/2006/relationships" xmlns:p="http://schemas.openxmlformats.org/presentationml/2006/main">
+  <p:cSld>
+    <p:spTree>
+      <p:nvGrpSpPr>
         <p:cNvPr id="1" name=""/>
         <p:cNvGrpSpPr/>
         <p:nvPr/>
@@ -4078,6 +5306,12 @@
           <a:p>
             <a:r>
               <a:rPr lang="fr-CH" dirty="0"/>
+              <a:t>L’erreur de calcul apparait dans le monde des tuples</a:t>
+            </a:r>
+          </a:p>
+          <a:p>
+            <a:r>
+              <a:rPr lang="fr-CH" dirty="0"/>
               <a:t>Clé publique connue (pas forcément le cas avec une écoute passive) ???</a:t>
             </a:r>
           </a:p>
@@ -4096,7 +5330,108 @@
 </p:sld>
 </file>
 
-<file path=ppt/slides/slide11.xml><?xml version="1.0" encoding="utf-8"?>
+<file path=ppt/slides/slide2.xml><?xml version="1.0" encoding="utf-8"?>
+<p:sld xmlns:a="http://schemas.openxmlformats.org/drawingml/2006/main" xmlns:r="http://schemas.openxmlformats.org/officeDocument/2006/relationships" xmlns:p="http://schemas.openxmlformats.org/presentationml/2006/main">
+  <p:cSld>
+    <p:spTree>
+      <p:nvGrpSpPr>
+        <p:cNvPr id="1" name=""/>
+        <p:cNvGrpSpPr/>
+        <p:nvPr/>
+      </p:nvGrpSpPr>
+      <p:grpSpPr>
+        <a:xfrm>
+          <a:off x="0" y="0"/>
+          <a:ext cx="0" cy="0"/>
+          <a:chOff x="0" y="0"/>
+          <a:chExt cx="0" cy="0"/>
+        </a:xfrm>
+      </p:grpSpPr>
+      <p:sp>
+        <p:nvSpPr>
+          <p:cNvPr id="2" name="Titre 1">
+            <a:extLst>
+              <a:ext uri="{FF2B5EF4-FFF2-40B4-BE49-F238E27FC236}">
+                <a16:creationId xmlns:a16="http://schemas.microsoft.com/office/drawing/2014/main" id="{C7519599-4D6D-F382-5CBF-FF9746EACCC1}"/>
+              </a:ext>
+            </a:extLst>
+          </p:cNvPr>
+          <p:cNvSpPr>
+            <a:spLocks noGrp="1"/>
+          </p:cNvSpPr>
+          <p:nvPr>
+            <p:ph type="title"/>
+          </p:nvPr>
+        </p:nvSpPr>
+        <p:spPr/>
+        <p:txBody>
+          <a:bodyPr/>
+          <a:lstStyle/>
+          <a:p>
+            <a:r>
+              <a:rPr lang="fr-CH" dirty="0"/>
+              <a:t>Intro</a:t>
+            </a:r>
+          </a:p>
+        </p:txBody>
+      </p:sp>
+      <p:sp>
+        <p:nvSpPr>
+          <p:cNvPr id="3" name="Espace réservé du contenu 2">
+            <a:extLst>
+              <a:ext uri="{FF2B5EF4-FFF2-40B4-BE49-F238E27FC236}">
+                <a16:creationId xmlns:a16="http://schemas.microsoft.com/office/drawing/2014/main" id="{179AE550-BC42-BF0F-46AA-21142C517507}"/>
+              </a:ext>
+            </a:extLst>
+          </p:cNvPr>
+          <p:cNvSpPr>
+            <a:spLocks noGrp="1"/>
+          </p:cNvSpPr>
+          <p:nvPr>
+            <p:ph idx="1"/>
+          </p:nvPr>
+        </p:nvSpPr>
+        <p:spPr/>
+        <p:txBody>
+          <a:bodyPr/>
+          <a:lstStyle/>
+          <a:p>
+            <a:r>
+              <a:rPr lang="fr-CH" dirty="0"/>
+              <a:t>Signatures largement répandues</a:t>
+            </a:r>
+          </a:p>
+          <a:p>
+            <a:r>
+              <a:rPr lang="fr-CH" dirty="0"/>
+              <a:t>Authentifier un client, serveur</a:t>
+            </a:r>
+          </a:p>
+          <a:p>
+            <a:r>
+              <a:rPr lang="fr-CH" dirty="0"/>
+              <a:t>Souvent combiné avec d’autres algorithmes cryptographiques</a:t>
+            </a:r>
+          </a:p>
+          <a:p>
+            <a:endParaRPr lang="fr-CH" dirty="0"/>
+          </a:p>
+        </p:txBody>
+      </p:sp>
+    </p:spTree>
+    <p:extLst>
+      <p:ext uri="{BB962C8B-B14F-4D97-AF65-F5344CB8AC3E}">
+        <p14:creationId xmlns:p14="http://schemas.microsoft.com/office/powerpoint/2010/main" val="1755347014"/>
+      </p:ext>
+    </p:extLst>
+  </p:cSld>
+  <p:clrMapOvr>
+    <a:masterClrMapping/>
+  </p:clrMapOvr>
+</p:sld>
+</file>
+
+<file path=ppt/slides/slide20.xml><?xml version="1.0" encoding="utf-8"?>
 <p:sld xmlns:a="http://schemas.openxmlformats.org/drawingml/2006/main" xmlns:r="http://schemas.openxmlformats.org/officeDocument/2006/relationships" xmlns:p="http://schemas.openxmlformats.org/presentationml/2006/main">
   <p:cSld>
     <p:spTree>
@@ -4268,6 +5603,80 @@
                           <a:latin typeface="Cambria Math" panose="02040503050406030204" pitchFamily="18" charset="0"/>
                         </a:rPr>
                         <m:t>N</m:t>
+                      </m:r>
+                    </m:oMath>
+                  </m:oMathPara>
+                </a14:m>
+                <a:endParaRPr lang="en-GB" b="0" dirty="0"/>
+              </a:p>
+              <a:p>
+                <a:pPr marL="0" indent="0">
+                  <a:buNone/>
+                </a:pPr>
+                <a14:m>
+                  <m:oMathPara xmlns:m="http://schemas.openxmlformats.org/officeDocument/2006/math">
+                    <m:oMathParaPr>
+                      <m:jc m:val="centerGroup"/>
+                    </m:oMathParaPr>
+                    <m:oMath xmlns:m="http://schemas.openxmlformats.org/officeDocument/2006/math">
+                      <m:r>
+                        <a:rPr lang="en-GB" b="0" i="1" smtClean="0">
+                          <a:latin typeface="Cambria Math" panose="02040503050406030204" pitchFamily="18" charset="0"/>
+                        </a:rPr>
+                        <m:t>𝑓</m:t>
+                      </m:r>
+                      <m:d>
+                        <m:dPr>
+                          <m:ctrlPr>
+                            <a:rPr lang="en-GB" b="0" i="1" smtClean="0">
+                              <a:latin typeface="Cambria Math" panose="02040503050406030204" pitchFamily="18" charset="0"/>
+                            </a:rPr>
+                          </m:ctrlPr>
+                        </m:dPr>
+                        <m:e>
+                          <m:r>
+                            <a:rPr lang="en-GB" b="0" i="1" smtClean="0">
+                              <a:latin typeface="Cambria Math" panose="02040503050406030204" pitchFamily="18" charset="0"/>
+                            </a:rPr>
+                            <m:t>𝑥</m:t>
+                          </m:r>
+                        </m:e>
+                      </m:d>
+                      <m:r>
+                        <a:rPr lang="en-GB" b="0" i="1" smtClean="0">
+                          <a:latin typeface="Cambria Math" panose="02040503050406030204" pitchFamily="18" charset="0"/>
+                        </a:rPr>
+                        <m:t> →</m:t>
+                      </m:r>
+                      <m:r>
+                        <a:rPr lang="en-GB" b="0" i="1" smtClean="0">
+                          <a:latin typeface="Cambria Math" panose="02040503050406030204" pitchFamily="18" charset="0"/>
+                        </a:rPr>
+                        <m:t>𝑓𝑜𝑛𝑐𝑡𝑖𝑜𝑛</m:t>
+                      </m:r>
+                      <m:r>
+                        <a:rPr lang="en-GB" b="0" i="1" smtClean="0">
+                          <a:latin typeface="Cambria Math" panose="02040503050406030204" pitchFamily="18" charset="0"/>
+                        </a:rPr>
+                        <m:t> </m:t>
+                      </m:r>
+                      <m:r>
+                        <a:rPr lang="en-GB" b="0" i="1" smtClean="0">
+                          <a:latin typeface="Cambria Math" panose="02040503050406030204" pitchFamily="18" charset="0"/>
+                        </a:rPr>
+                        <m:t>𝑑𝑒</m:t>
+                      </m:r>
+                      <m:r>
+                        <a:rPr lang="en-GB" b="0" i="1" smtClean="0">
+                          <a:latin typeface="Cambria Math" panose="02040503050406030204" pitchFamily="18" charset="0"/>
+                        </a:rPr>
+                        <m:t> </m:t>
+                      </m:r>
+                      <m:r>
+                        <a:rPr lang="en-GB" b="0" i="1" smtClean="0">
+                          <a:latin typeface="Cambria Math" panose="02040503050406030204" pitchFamily="18" charset="0"/>
+                        </a:rPr>
+                        <m:t>𝑝𝑎𝑑𝑑𝑖𝑛𝑔</m:t>
                       </m:r>
                     </m:oMath>
                   </m:oMathPara>
@@ -4435,14 +5844,7 @@
                           <a:latin typeface="Cambria Math" panose="02040503050406030204" pitchFamily="18" charset="0"/>
                           <a:ea typeface="Cambria Math" panose="02040503050406030204" pitchFamily="18" charset="0"/>
                         </a:rPr>
-                        <m:t>=</m:t>
-                      </m:r>
-                      <m:r>
-                        <a:rPr lang="en-GB" b="0" i="1" smtClean="0">
-                          <a:latin typeface="Cambria Math" panose="02040503050406030204" pitchFamily="18" charset="0"/>
-                          <a:ea typeface="Cambria Math" panose="02040503050406030204" pitchFamily="18" charset="0"/>
-                        </a:rPr>
-                        <m:t>?</m:t>
+                        <m:t>=?</m:t>
                       </m:r>
                       <m:r>
                         <a:rPr lang="en-GB" b="0" i="1" smtClean="0">
@@ -4554,7 +5956,7 @@
 </p:sld>
 </file>
 
-<file path=ppt/slides/slide12.xml><?xml version="1.0" encoding="utf-8"?>
+<file path=ppt/slides/slide21.xml><?xml version="1.0" encoding="utf-8"?>
 <p:sld xmlns:a="http://schemas.openxmlformats.org/drawingml/2006/main" xmlns:r="http://schemas.openxmlformats.org/officeDocument/2006/relationships" xmlns:p="http://schemas.openxmlformats.org/presentationml/2006/main">
   <p:cSld>
     <p:spTree>
@@ -4610,8 +6012,8 @@
           </a:p>
         </p:txBody>
       </p:sp>
-      <mc:AlternateContent xmlns:mc="http://schemas.openxmlformats.org/markup-compatibility/2006">
-        <mc:Choice xmlns:a14="http://schemas.microsoft.com/office/drawing/2010/main" Requires="a14">
+      <mc:AlternateContent xmlns:mc="http://schemas.openxmlformats.org/markup-compatibility/2006" xmlns:a14="http://schemas.microsoft.com/office/drawing/2010/main">
+        <mc:Choice Requires="a14">
           <p:sp>
             <p:nvSpPr>
               <p:cNvPr id="3" name="Espace réservé du contenu 2">
@@ -4730,7 +6132,7 @@
             </p:txBody>
           </p:sp>
         </mc:Choice>
-        <mc:Fallback>
+        <mc:Fallback xmlns="">
           <p:sp>
             <p:nvSpPr>
               <p:cNvPr id="3" name="Espace réservé du contenu 2">
@@ -4783,7 +6185,278 @@
 </p:sld>
 </file>
 
-<file path=ppt/slides/slide13.xml><?xml version="1.0" encoding="utf-8"?>
+<file path=ppt/slides/slide22.xml><?xml version="1.0" encoding="utf-8"?>
+<p:sld xmlns:a="http://schemas.openxmlformats.org/drawingml/2006/main" xmlns:r="http://schemas.openxmlformats.org/officeDocument/2006/relationships" xmlns:p="http://schemas.openxmlformats.org/presentationml/2006/main">
+  <p:cSld>
+    <p:spTree>
+      <p:nvGrpSpPr>
+        <p:cNvPr id="1" name="">
+          <a:extLst>
+            <a:ext uri="{FF2B5EF4-FFF2-40B4-BE49-F238E27FC236}">
+              <a16:creationId xmlns:a16="http://schemas.microsoft.com/office/drawing/2014/main" id="{BD29B48C-03D8-5E70-9FE6-62BE8318AFCA}"/>
+            </a:ext>
+          </a:extLst>
+        </p:cNvPr>
+        <p:cNvGrpSpPr/>
+        <p:nvPr/>
+      </p:nvGrpSpPr>
+      <p:grpSpPr>
+        <a:xfrm>
+          <a:off x="0" y="0"/>
+          <a:ext cx="0" cy="0"/>
+          <a:chOff x="0" y="0"/>
+          <a:chExt cx="0" cy="0"/>
+        </a:xfrm>
+      </p:grpSpPr>
+      <p:sp>
+        <p:nvSpPr>
+          <p:cNvPr id="2" name="Titre 1">
+            <a:extLst>
+              <a:ext uri="{FF2B5EF4-FFF2-40B4-BE49-F238E27FC236}">
+                <a16:creationId xmlns:a16="http://schemas.microsoft.com/office/drawing/2014/main" id="{4B4F9520-154C-ECF6-2CB7-4EA0A1B7B480}"/>
+              </a:ext>
+            </a:extLst>
+          </p:cNvPr>
+          <p:cNvSpPr>
+            <a:spLocks noGrp="1"/>
+          </p:cNvSpPr>
+          <p:nvPr>
+            <p:ph type="title"/>
+          </p:nvPr>
+        </p:nvSpPr>
+        <p:spPr/>
+        <p:txBody>
+          <a:bodyPr/>
+          <a:lstStyle/>
+          <a:p>
+            <a:r>
+              <a:rPr lang="fr-CH" dirty="0"/>
+              <a:t>Expression du </a:t>
+            </a:r>
+            <a:r>
+              <a:rPr lang="fr-CH" dirty="0" err="1"/>
+              <a:t>padding</a:t>
+            </a:r>
+            <a:endParaRPr lang="fr-CH" dirty="0"/>
+          </a:p>
+        </p:txBody>
+      </p:sp>
+      <mc:AlternateContent xmlns:mc="http://schemas.openxmlformats.org/markup-compatibility/2006">
+        <mc:Choice xmlns:a14="http://schemas.microsoft.com/office/drawing/2010/main" Requires="a14">
+          <p:sp>
+            <p:nvSpPr>
+              <p:cNvPr id="3" name="Espace réservé du contenu 2">
+                <a:extLst>
+                  <a:ext uri="{FF2B5EF4-FFF2-40B4-BE49-F238E27FC236}">
+                    <a16:creationId xmlns:a16="http://schemas.microsoft.com/office/drawing/2014/main" id="{0266946E-282A-1A70-13BC-DBE1DCEA50B8}"/>
+                  </a:ext>
+                </a:extLst>
+              </p:cNvPr>
+              <p:cNvSpPr>
+                <a:spLocks noGrp="1"/>
+              </p:cNvSpPr>
+              <p:nvPr>
+                <p:ph idx="1"/>
+              </p:nvPr>
+            </p:nvSpPr>
+            <p:spPr/>
+            <p:txBody>
+              <a:bodyPr/>
+              <a:lstStyle/>
+              <a:p>
+                <a:r>
+                  <a:rPr lang="fr-CH" dirty="0"/>
+                  <a:t> PKCS#1 V1.5</a:t>
+                </a:r>
+              </a:p>
+              <a:p>
+                <a:endParaRPr lang="fr-CH" dirty="0"/>
+              </a:p>
+              <a:p>
+                <a:pPr marL="0" indent="0" algn="ctr">
+                  <a:buNone/>
+                </a:pPr>
+                <a:r>
+                  <a:rPr lang="fr-CH" b="0" dirty="0">
+                    <a:highlight>
+                      <a:srgbClr val="00FF00"/>
+                    </a:highlight>
+                    <a:latin typeface="Cambria Math" panose="02040503050406030204" pitchFamily="18" charset="0"/>
+                  </a:rPr>
+                  <a:t>00 || 01 || FF ... FF || ASN.1 </a:t>
+                </a:r>
+                <a:r>
+                  <a:rPr lang="fr-CH" b="0" dirty="0">
+                    <a:latin typeface="Cambria Math" panose="02040503050406030204" pitchFamily="18" charset="0"/>
+                  </a:rPr>
+                  <a:t>|| </a:t>
+                </a:r>
+                <a:r>
+                  <a:rPr lang="fr-CH" b="0" dirty="0">
+                    <a:highlight>
+                      <a:srgbClr val="FF0000"/>
+                    </a:highlight>
+                    <a:latin typeface="Cambria Math" panose="02040503050406030204" pitchFamily="18" charset="0"/>
+                  </a:rPr>
+                  <a:t>Hash(m)</a:t>
+                </a:r>
+              </a:p>
+              <a:p>
+                <a:pPr marL="0" indent="0">
+                  <a:buNone/>
+                </a:pPr>
+                <a:endParaRPr lang="fr-CH" i="1" dirty="0">
+                  <a:latin typeface="Cambria Math" panose="02040503050406030204" pitchFamily="18" charset="0"/>
+                </a:endParaRPr>
+              </a:p>
+              <a:p>
+                <a:pPr marL="0" indent="0">
+                  <a:buNone/>
+                </a:pPr>
+                <a:endParaRPr lang="en-GB" b="0" i="1" dirty="0">
+                  <a:latin typeface="Cambria Math" panose="02040503050406030204" pitchFamily="18" charset="0"/>
+                </a:endParaRPr>
+              </a:p>
+              <a:p>
+                <a:pPr marL="0" indent="0">
+                  <a:buNone/>
+                </a:pPr>
+                <a14:m>
+                  <m:oMathPara xmlns:m="http://schemas.openxmlformats.org/officeDocument/2006/math">
+                    <m:oMathParaPr>
+                      <m:jc m:val="centerGroup"/>
+                    </m:oMathParaPr>
+                    <m:oMath xmlns:m="http://schemas.openxmlformats.org/officeDocument/2006/math">
+                      <m:r>
+                        <a:rPr lang="en-GB" b="0" i="1" smtClean="0">
+                          <a:highlight>
+                            <a:srgbClr val="00FF00"/>
+                          </a:highlight>
+                          <a:latin typeface="Cambria Math" panose="02040503050406030204" pitchFamily="18" charset="0"/>
+                        </a:rPr>
+                        <m:t>𝑎</m:t>
+                      </m:r>
+                      <m:r>
+                        <a:rPr lang="en-GB" b="0" i="1" smtClean="0">
+                          <a:latin typeface="Cambria Math" panose="02040503050406030204" pitchFamily="18" charset="0"/>
+                        </a:rPr>
+                        <m:t>+</m:t>
+                      </m:r>
+                      <m:r>
+                        <a:rPr lang="en-GB" b="0" i="1" smtClean="0">
+                          <a:highlight>
+                            <a:srgbClr val="FF0000"/>
+                          </a:highlight>
+                          <a:latin typeface="Cambria Math" panose="02040503050406030204" pitchFamily="18" charset="0"/>
+                        </a:rPr>
+                        <m:t>𝑥</m:t>
+                      </m:r>
+                    </m:oMath>
+                  </m:oMathPara>
+                </a14:m>
+                <a:endParaRPr lang="fr-CH" dirty="0">
+                  <a:highlight>
+                    <a:srgbClr val="FF0000"/>
+                  </a:highlight>
+                </a:endParaRPr>
+              </a:p>
+              <a:p>
+                <a:r>
+                  <a:rPr lang="fr-CH" i="1" dirty="0">
+                    <a:highlight>
+                      <a:srgbClr val="00FF00"/>
+                    </a:highlight>
+                    <a:latin typeface="Cambria Math" panose="02040503050406030204" pitchFamily="18" charset="0"/>
+                    <a:ea typeface="Cambria Math" panose="02040503050406030204" pitchFamily="18" charset="0"/>
+                  </a:rPr>
+                  <a:t>a</a:t>
+                </a:r>
+                <a:r>
+                  <a:rPr lang="fr-CH" dirty="0">
+                    <a:highlight>
+                      <a:srgbClr val="00FF00"/>
+                    </a:highlight>
+                  </a:rPr>
+                  <a:t> connu</a:t>
+                </a:r>
+              </a:p>
+              <a:p>
+                <a:r>
+                  <a:rPr lang="fr-CH" i="1" dirty="0">
+                    <a:highlight>
+                      <a:srgbClr val="FF0000"/>
+                    </a:highlight>
+                    <a:latin typeface="Cambria Math" panose="02040503050406030204" pitchFamily="18" charset="0"/>
+                    <a:ea typeface="Cambria Math" panose="02040503050406030204" pitchFamily="18" charset="0"/>
+                  </a:rPr>
+                  <a:t>x</a:t>
+                </a:r>
+                <a:r>
+                  <a:rPr lang="fr-CH" dirty="0">
+                    <a:highlight>
+                      <a:srgbClr val="FF0000"/>
+                    </a:highlight>
+                  </a:rPr>
+                  <a:t> inconnu</a:t>
+                </a:r>
+              </a:p>
+            </p:txBody>
+          </p:sp>
+        </mc:Choice>
+        <mc:Fallback>
+          <p:sp>
+            <p:nvSpPr>
+              <p:cNvPr id="3" name="Espace réservé du contenu 2">
+                <a:extLst>
+                  <a:ext uri="{FF2B5EF4-FFF2-40B4-BE49-F238E27FC236}">
+                    <a16:creationId xmlns:a16="http://schemas.microsoft.com/office/drawing/2014/main" id="{0266946E-282A-1A70-13BC-DBE1DCEA50B8}"/>
+                  </a:ext>
+                </a:extLst>
+              </p:cNvPr>
+              <p:cNvSpPr>
+                <a:spLocks noGrp="1" noRot="1" noChangeAspect="1" noMove="1" noResize="1" noEditPoints="1" noAdjustHandles="1" noChangeArrowheads="1" noChangeShapeType="1" noTextEdit="1"/>
+              </p:cNvSpPr>
+              <p:nvPr>
+                <p:ph idx="1"/>
+              </p:nvPr>
+            </p:nvSpPr>
+            <p:spPr>
+              <a:blipFill>
+                <a:blip r:embed="rId2"/>
+                <a:stretch>
+                  <a:fillRect l="-1043" t="-2381"/>
+                </a:stretch>
+              </a:blipFill>
+            </p:spPr>
+            <p:txBody>
+              <a:bodyPr/>
+              <a:lstStyle/>
+              <a:p>
+                <a:r>
+                  <a:rPr lang="fr-CH">
+                    <a:noFill/>
+                  </a:rPr>
+                  <a:t> </a:t>
+                </a:r>
+              </a:p>
+            </p:txBody>
+          </p:sp>
+        </mc:Fallback>
+      </mc:AlternateContent>
+    </p:spTree>
+    <p:extLst>
+      <p:ext uri="{BB962C8B-B14F-4D97-AF65-F5344CB8AC3E}">
+        <p14:creationId xmlns:p14="http://schemas.microsoft.com/office/powerpoint/2010/main" val="944965802"/>
+      </p:ext>
+    </p:extLst>
+  </p:cSld>
+  <p:clrMapOvr>
+    <a:masterClrMapping/>
+  </p:clrMapOvr>
+</p:sld>
+</file>
+
+<file path=ppt/slides/slide23.xml><?xml version="1.0" encoding="utf-8"?>
 <p:sld xmlns:a="http://schemas.openxmlformats.org/drawingml/2006/main" xmlns:r="http://schemas.openxmlformats.org/officeDocument/2006/relationships" xmlns:p="http://schemas.openxmlformats.org/presentationml/2006/main">
   <p:cSld>
     <p:spTree>
@@ -4857,24 +6530,98 @@
                   <a:rPr lang="fr-CH" dirty="0"/>
                   <a:t>Posons </a:t>
                 </a:r>
+                <a14:m>
+                  <m:oMath xmlns:m="http://schemas.openxmlformats.org/officeDocument/2006/math">
+                    <m:r>
+                      <a:rPr lang="en-GB" b="0" i="1" smtClean="0">
+                        <a:latin typeface="Cambria Math" panose="02040503050406030204" pitchFamily="18" charset="0"/>
+                      </a:rPr>
+                      <m:t>𝑥</m:t>
+                    </m:r>
+                    <m:r>
+                      <a:rPr lang="en-GB" b="0" i="1" smtClean="0">
+                        <a:latin typeface="Cambria Math" panose="02040503050406030204" pitchFamily="18" charset="0"/>
+                      </a:rPr>
+                      <m:t> </m:t>
+                    </m:r>
+                  </m:oMath>
+                </a14:m>
+                <a:r>
+                  <a:rPr lang="fr-CH" dirty="0"/>
+                  <a:t>et </a:t>
+                </a:r>
+                <a14:m>
+                  <m:oMath xmlns:m="http://schemas.openxmlformats.org/officeDocument/2006/math">
+                    <m:sSup>
+                      <m:sSupPr>
+                        <m:ctrlPr>
+                          <a:rPr lang="en-GB" b="0" i="1" smtClean="0">
+                            <a:latin typeface="Cambria Math" panose="02040503050406030204" pitchFamily="18" charset="0"/>
+                          </a:rPr>
+                        </m:ctrlPr>
+                      </m:sSupPr>
+                      <m:e>
+                        <m:r>
+                          <a:rPr lang="en-GB" b="0" i="1" smtClean="0">
+                            <a:latin typeface="Cambria Math" panose="02040503050406030204" pitchFamily="18" charset="0"/>
+                          </a:rPr>
+                          <m:t>𝑥</m:t>
+                        </m:r>
+                      </m:e>
+                      <m:sup>
+                        <m:r>
+                          <a:rPr lang="en-GB" b="0" i="1" smtClean="0">
+                            <a:latin typeface="Cambria Math" panose="02040503050406030204" pitchFamily="18" charset="0"/>
+                          </a:rPr>
+                          <m:t>′</m:t>
+                        </m:r>
+                      </m:sup>
+                    </m:sSup>
+                  </m:oMath>
+                </a14:m>
                 <a:r>
                   <a:rPr lang="fr-CH" dirty="0">
                     <a:latin typeface="Cambria Math" panose="02040503050406030204" pitchFamily="18" charset="0"/>
                     <a:ea typeface="Cambria Math" panose="02040503050406030204" pitchFamily="18" charset="0"/>
                   </a:rPr>
-                  <a:t>x</a:t>
+                  <a:t>avec </a:t>
                 </a:r>
-                <a:r>
-                  <a:rPr lang="fr-CH" dirty="0"/>
-                  <a:t> et </a:t>
-                </a:r>
-                <a:r>
-                  <a:rPr lang="fr-CH" dirty="0">
-                    <a:latin typeface="Cambria Math" panose="02040503050406030204" pitchFamily="18" charset="0"/>
-                    <a:ea typeface="Cambria Math" panose="02040503050406030204" pitchFamily="18" charset="0"/>
-                  </a:rPr>
-                  <a:t>x’</a:t>
-                </a:r>
+                <a14:m>
+                  <m:oMath xmlns:m="http://schemas.openxmlformats.org/officeDocument/2006/math">
+                    <m:r>
+                      <a:rPr lang="en-GB" b="0" i="1" smtClean="0">
+                        <a:latin typeface="Cambria Math" panose="02040503050406030204" pitchFamily="18" charset="0"/>
+                        <a:ea typeface="Cambria Math" panose="02040503050406030204" pitchFamily="18" charset="0"/>
+                      </a:rPr>
+                      <m:t>𝑥</m:t>
+                    </m:r>
+                    <m:r>
+                      <a:rPr lang="en-GB" b="0" i="1" smtClean="0">
+                        <a:latin typeface="Cambria Math" panose="02040503050406030204" pitchFamily="18" charset="0"/>
+                        <a:ea typeface="Cambria Math" panose="02040503050406030204" pitchFamily="18" charset="0"/>
+                      </a:rPr>
+                      <m:t> ≠</m:t>
+                    </m:r>
+                    <m:r>
+                      <a:rPr lang="en-GB" b="0" i="1" smtClean="0">
+                        <a:latin typeface="Cambria Math" panose="02040503050406030204" pitchFamily="18" charset="0"/>
+                        <a:ea typeface="Cambria Math" panose="02040503050406030204" pitchFamily="18" charset="0"/>
+                      </a:rPr>
+                      <m:t>𝑥</m:t>
+                    </m:r>
+                    <m:r>
+                      <a:rPr lang="en-GB" b="0" i="1" smtClean="0">
+                        <a:latin typeface="Cambria Math" panose="02040503050406030204" pitchFamily="18" charset="0"/>
+                        <a:ea typeface="Cambria Math" panose="02040503050406030204" pitchFamily="18" charset="0"/>
+                      </a:rPr>
+                      <m:t>′</m:t>
+                    </m:r>
+                  </m:oMath>
+                </a14:m>
+                <a:endParaRPr lang="fr-CH" dirty="0">
+                  <a:latin typeface="Cambria Math" panose="02040503050406030204" pitchFamily="18" charset="0"/>
+                  <a:ea typeface="Cambria Math" panose="02040503050406030204" pitchFamily="18" charset="0"/>
+                </a:endParaRPr>
               </a:p>
               <a:p>
                 <a:r>
@@ -5240,7 +6987,7 @@
 </p:sld>
 </file>
 
-<file path=ppt/slides/slide14.xml><?xml version="1.0" encoding="utf-8"?>
+<file path=ppt/slides/slide24.xml><?xml version="1.0" encoding="utf-8"?>
 <p:sld xmlns:a="http://schemas.openxmlformats.org/drawingml/2006/main" xmlns:r="http://schemas.openxmlformats.org/officeDocument/2006/relationships" xmlns:p="http://schemas.openxmlformats.org/presentationml/2006/main">
   <p:cSld>
     <p:spTree>
@@ -5665,6 +7412,67 @@
                   <a:ea typeface="Cambria Math" panose="02040503050406030204" pitchFamily="18" charset="0"/>
                 </a:endParaRPr>
               </a:p>
+              <a:p>
+                <a:pPr marL="0" indent="0" algn="ctr">
+                  <a:buNone/>
+                </a:pPr>
+                <a:endParaRPr lang="fr-CH" dirty="0">
+                  <a:latin typeface="Cambria Math" panose="02040503050406030204" pitchFamily="18" charset="0"/>
+                  <a:ea typeface="Cambria Math" panose="02040503050406030204" pitchFamily="18" charset="0"/>
+                </a:endParaRPr>
+              </a:p>
+              <a:p>
+                <a:pPr marL="0" indent="0">
+                  <a:buNone/>
+                </a:pPr>
+                <a:r>
+                  <a:rPr lang="fr-CH" dirty="0">
+                    <a:ea typeface="Cambria Math" panose="02040503050406030204" pitchFamily="18" charset="0"/>
+                  </a:rPr>
+                  <a:t>Avec </a:t>
+                </a:r>
+                <a14:m>
+                  <m:oMath xmlns:m="http://schemas.openxmlformats.org/officeDocument/2006/math">
+                    <m:r>
+                      <a:rPr lang="en-GB" b="0" i="1" smtClean="0">
+                        <a:latin typeface="Cambria Math" panose="02040503050406030204" pitchFamily="18" charset="0"/>
+                        <a:ea typeface="Cambria Math" panose="02040503050406030204" pitchFamily="18" charset="0"/>
+                      </a:rPr>
+                      <m:t>𝑥</m:t>
+                    </m:r>
+                  </m:oMath>
+                </a14:m>
+                <a:r>
+                  <a:rPr lang="fr-CH" dirty="0">
+                    <a:ea typeface="Cambria Math" panose="02040503050406030204" pitchFamily="18" charset="0"/>
+                  </a:rPr>
+                  <a:t> une signature valide et </a:t>
+                </a:r>
+                <a14:m>
+                  <m:oMath xmlns:m="http://schemas.openxmlformats.org/officeDocument/2006/math">
+                    <m:r>
+                      <a:rPr lang="en-GB" b="0" i="1" smtClean="0">
+                        <a:latin typeface="Cambria Math" panose="02040503050406030204" pitchFamily="18" charset="0"/>
+                        <a:ea typeface="Cambria Math" panose="02040503050406030204" pitchFamily="18" charset="0"/>
+                      </a:rPr>
+                      <m:t>𝑥</m:t>
+                    </m:r>
+                    <m:r>
+                      <a:rPr lang="en-GB" b="0" i="1" smtClean="0">
+                        <a:latin typeface="Cambria Math" panose="02040503050406030204" pitchFamily="18" charset="0"/>
+                        <a:ea typeface="Cambria Math" panose="02040503050406030204" pitchFamily="18" charset="0"/>
+                      </a:rPr>
+                      <m:t>′</m:t>
+                    </m:r>
+                  </m:oMath>
+                </a14:m>
+                <a:r>
+                  <a:rPr lang="fr-CH" dirty="0">
+                    <a:ea typeface="Cambria Math" panose="02040503050406030204" pitchFamily="18" charset="0"/>
+                  </a:rPr>
+                  <a:t> une signature invalide par exemple.</a:t>
+                </a:r>
+              </a:p>
             </p:txBody>
           </p:sp>
         </mc:Choice>
@@ -5689,7 +7497,7 @@
               <a:blipFill>
                 <a:blip r:embed="rId2"/>
                 <a:stretch>
-                  <a:fillRect/>
+                  <a:fillRect l="-1217"/>
                 </a:stretch>
               </a:blipFill>
             </p:spPr>
@@ -5721,7 +7529,7 @@
 </p:sld>
 </file>
 
-<file path=ppt/slides/slide15.xml><?xml version="1.0" encoding="utf-8"?>
+<file path=ppt/slides/slide25.xml><?xml version="1.0" encoding="utf-8"?>
 <p:sld xmlns:a="http://schemas.openxmlformats.org/drawingml/2006/main" xmlns:r="http://schemas.openxmlformats.org/officeDocument/2006/relationships" xmlns:p="http://schemas.openxmlformats.org/presentationml/2006/main">
   <p:cSld>
     <p:spTree>
@@ -5804,7 +7612,7 @@
 </p:sld>
 </file>
 
-<file path=ppt/slides/slide16.xml><?xml version="1.0" encoding="utf-8"?>
+<file path=ppt/slides/slide26.xml><?xml version="1.0" encoding="utf-8"?>
 <p:sld xmlns:a="http://schemas.openxmlformats.org/drawingml/2006/main" xmlns:r="http://schemas.openxmlformats.org/officeDocument/2006/relationships" xmlns:p="http://schemas.openxmlformats.org/presentationml/2006/main">
   <p:cSld>
     <p:spTree>
@@ -5916,7 +7724,7 @@
               <a:rPr lang="fr-CH" dirty="0">
                 <a:ea typeface="Cambria Math" panose="02040503050406030204" pitchFamily="18" charset="0"/>
               </a:rPr>
-              <a:t>Que pouvons nous faire avec ces valeurs ?</a:t>
+              <a:t>Que pouvons-nous faire avec ces valeurs ?</a:t>
             </a:r>
             <a:endParaRPr lang="fr-CH" dirty="0"/>
           </a:p>
@@ -5935,7 +7743,7 @@
 </p:sld>
 </file>
 
-<file path=ppt/slides/slide17.xml><?xml version="1.0" encoding="utf-8"?>
+<file path=ppt/slides/slide27.xml><?xml version="1.0" encoding="utf-8"?>
 <p:sld xmlns:a="http://schemas.openxmlformats.org/drawingml/2006/main" xmlns:r="http://schemas.openxmlformats.org/officeDocument/2006/relationships" xmlns:p="http://schemas.openxmlformats.org/presentationml/2006/main">
   <p:cSld>
     <p:spTree>
@@ -5980,8 +7788,8 @@
           </a:p>
         </p:txBody>
       </p:sp>
-      <mc:AlternateContent xmlns:mc="http://schemas.openxmlformats.org/markup-compatibility/2006">
-        <mc:Choice xmlns:a14="http://schemas.microsoft.com/office/drawing/2010/main" Requires="a14">
+      <mc:AlternateContent xmlns:mc="http://schemas.openxmlformats.org/markup-compatibility/2006" xmlns:a14="http://schemas.microsoft.com/office/drawing/2010/main">
+        <mc:Choice Requires="a14">
           <p:sp>
             <p:nvSpPr>
               <p:cNvPr id="3" name="Espace réservé du contenu 2">
@@ -6291,7 +8099,7 @@
             </p:txBody>
           </p:sp>
         </mc:Choice>
-        <mc:Fallback>
+        <mc:Fallback xmlns="">
           <p:sp>
             <p:nvSpPr>
               <p:cNvPr id="3" name="Espace réservé du contenu 2">
@@ -6344,7 +8152,7 @@
 </p:sld>
 </file>
 
-<file path=ppt/slides/slide18.xml><?xml version="1.0" encoding="utf-8"?>
+<file path=ppt/slides/slide28.xml><?xml version="1.0" encoding="utf-8"?>
 <p:sld xmlns:a="http://schemas.openxmlformats.org/drawingml/2006/main" xmlns:r="http://schemas.openxmlformats.org/officeDocument/2006/relationships" xmlns:p="http://schemas.openxmlformats.org/presentationml/2006/main">
   <p:cSld>
     <p:spTree>
@@ -6652,7 +8460,16 @@
                   <a:rPr lang="fr-CH" dirty="0">
                     <a:latin typeface="Cambria Math" panose="02040503050406030204" pitchFamily="18" charset="0"/>
                   </a:rPr>
-                  <a:t> || 00 ... 00 || XX…XXX</a:t>
+                  <a:t> || 00 ... 00 || </a:t>
+                </a:r>
+                <a:r>
+                  <a:rPr lang="fr-CH" dirty="0">
+                    <a:highlight>
+                      <a:srgbClr val="FFFF00"/>
+                    </a:highlight>
+                    <a:latin typeface="Cambria Math" panose="02040503050406030204" pitchFamily="18" charset="0"/>
+                  </a:rPr>
+                  <a:t>XX…XXX</a:t>
                 </a:r>
               </a:p>
             </p:txBody>
@@ -6711,7 +8528,7 @@
 </p:sld>
 </file>
 
-<file path=ppt/slides/slide19.xml><?xml version="1.0" encoding="utf-8"?>
+<file path=ppt/slides/slide29.xml><?xml version="1.0" encoding="utf-8"?>
 <p:sld xmlns:a="http://schemas.openxmlformats.org/drawingml/2006/main" xmlns:r="http://schemas.openxmlformats.org/officeDocument/2006/relationships" xmlns:p="http://schemas.openxmlformats.org/presentationml/2006/main">
   <p:cSld>
     <p:spTree>
@@ -6756,8 +8573,8 @@
           </a:p>
         </p:txBody>
       </p:sp>
-      <mc:AlternateContent xmlns:mc="http://schemas.openxmlformats.org/markup-compatibility/2006">
-        <mc:Choice xmlns:a14="http://schemas.microsoft.com/office/drawing/2010/main" Requires="a14">
+      <mc:AlternateContent xmlns:mc="http://schemas.openxmlformats.org/markup-compatibility/2006" xmlns:a14="http://schemas.microsoft.com/office/drawing/2010/main">
+        <mc:Choice Requires="a14">
           <p:sp>
             <p:nvSpPr>
               <p:cNvPr id="3" name="Espace réservé du contenu 2">
@@ -6987,7 +8804,7 @@
             </p:txBody>
           </p:sp>
         </mc:Choice>
-        <mc:Fallback>
+        <mc:Fallback xmlns="">
           <p:sp>
             <p:nvSpPr>
               <p:cNvPr id="3" name="Espace réservé du contenu 2">
@@ -7040,7 +8857,7 @@
 </p:sld>
 </file>
 
-<file path=ppt/slides/slide2.xml><?xml version="1.0" encoding="utf-8"?>
+<file path=ppt/slides/slide3.xml><?xml version="1.0" encoding="utf-8"?>
 <p:sld xmlns:a="http://schemas.openxmlformats.org/drawingml/2006/main" xmlns:r="http://schemas.openxmlformats.org/officeDocument/2006/relationships" xmlns:p="http://schemas.openxmlformats.org/presentationml/2006/main">
   <p:cSld>
     <p:spTree>
@@ -7062,7 +8879,7 @@
           <p:cNvPr id="2" name="Titre 1">
             <a:extLst>
               <a:ext uri="{FF2B5EF4-FFF2-40B4-BE49-F238E27FC236}">
-                <a16:creationId xmlns:a16="http://schemas.microsoft.com/office/drawing/2014/main" id="{C7519599-4D6D-F382-5CBF-FF9746EACCC1}"/>
+                <a16:creationId xmlns:a16="http://schemas.microsoft.com/office/drawing/2014/main" id="{ABCA9630-E3A4-01F1-DC02-8D11AE85A440}"/>
               </a:ext>
             </a:extLst>
           </p:cNvPr>
@@ -7080,7 +8897,7 @@
           <a:p>
             <a:r>
               <a:rPr lang="fr-CH" dirty="0"/>
-              <a:t>Intro</a:t>
+              <a:t>L’attaque en bref</a:t>
             </a:r>
           </a:p>
         </p:txBody>
@@ -7090,7 +8907,7 @@
           <p:cNvPr id="3" name="Espace réservé du contenu 2">
             <a:extLst>
               <a:ext uri="{FF2B5EF4-FFF2-40B4-BE49-F238E27FC236}">
-                <a16:creationId xmlns:a16="http://schemas.microsoft.com/office/drawing/2014/main" id="{179AE550-BC42-BF0F-46AA-21142C517507}"/>
+                <a16:creationId xmlns:a16="http://schemas.microsoft.com/office/drawing/2014/main" id="{68FF2868-1122-9061-B5E0-99459AB4AC21}"/>
               </a:ext>
             </a:extLst>
           </p:cNvPr>
@@ -7108,19 +8925,36 @@
           <a:p>
             <a:r>
               <a:rPr lang="fr-CH" dirty="0"/>
-              <a:t>Signatures largement répandues</a:t>
+              <a:t>Écoute passive</a:t>
             </a:r>
           </a:p>
           <a:p>
             <a:r>
               <a:rPr lang="fr-CH" dirty="0"/>
-              <a:t>Authentifier un client, serveur</a:t>
-            </a:r>
+              <a:t>SSH ou </a:t>
+            </a:r>
+            <a:r>
+              <a:rPr lang="fr-CH" dirty="0" err="1"/>
+              <a:t>IPsec</a:t>
+            </a:r>
+            <a:endParaRPr lang="fr-CH" dirty="0"/>
           </a:p>
           <a:p>
             <a:r>
               <a:rPr lang="fr-CH" dirty="0"/>
-              <a:t>Souvent combiné avec d’autres algorithmes cryptographiques</a:t>
+              <a:t>Une signature PKCS#1 V1.5 invalide nécessaire</a:t>
+            </a:r>
+          </a:p>
+          <a:p>
+            <a:r>
+              <a:rPr lang="fr-CH" dirty="0"/>
+              <a:t>Pour un message inconnu</a:t>
+            </a:r>
+          </a:p>
+          <a:p>
+            <a:r>
+              <a:rPr lang="fr-CH" dirty="0"/>
+              <a:t>Signature calculée en utilisant le théorème des restes chinois</a:t>
             </a:r>
           </a:p>
           <a:p>
@@ -7131,7 +8965,7 @@
     </p:spTree>
     <p:extLst>
       <p:ext uri="{BB962C8B-B14F-4D97-AF65-F5344CB8AC3E}">
-        <p14:creationId xmlns:p14="http://schemas.microsoft.com/office/powerpoint/2010/main" val="1755347014"/>
+        <p14:creationId xmlns:p14="http://schemas.microsoft.com/office/powerpoint/2010/main" val="167832716"/>
       </p:ext>
     </p:extLst>
   </p:cSld>
@@ -7141,7 +8975,7 @@
 </p:sld>
 </file>
 
-<file path=ppt/slides/slide20.xml><?xml version="1.0" encoding="utf-8"?>
+<file path=ppt/slides/slide30.xml><?xml version="1.0" encoding="utf-8"?>
 <p:sld xmlns:a="http://schemas.openxmlformats.org/drawingml/2006/main" xmlns:r="http://schemas.openxmlformats.org/officeDocument/2006/relationships" xmlns:p="http://schemas.openxmlformats.org/presentationml/2006/main">
   <p:cSld>
     <p:spTree>
@@ -7452,12 +9286,31 @@
                         </a:rPr>
                         <m:t>+</m:t>
                       </m:r>
-                      <m:r>
-                        <a:rPr lang="en-GB" b="0" i="1" smtClean="0">
-                          <a:latin typeface="Cambria Math" panose="02040503050406030204" pitchFamily="18" charset="0"/>
-                        </a:rPr>
-                        <m:t>h</m:t>
-                      </m:r>
+                      <m:sSub>
+                        <m:sSubPr>
+                          <m:ctrlPr>
+                            <a:rPr lang="en-GB" b="0" i="1" smtClean="0">
+                              <a:latin typeface="Cambria Math" panose="02040503050406030204" pitchFamily="18" charset="0"/>
+                            </a:rPr>
+                          </m:ctrlPr>
+                        </m:sSubPr>
+                        <m:e>
+                          <m:r>
+                            <a:rPr lang="en-GB" b="0" i="1" smtClean="0">
+                              <a:latin typeface="Cambria Math" panose="02040503050406030204" pitchFamily="18" charset="0"/>
+                            </a:rPr>
+                            <m:t>𝑟</m:t>
+                          </m:r>
+                        </m:e>
+                        <m:sub>
+                          <m:r>
+                            <a:rPr lang="en-GB" b="0" i="1" smtClean="0">
+                              <a:latin typeface="Cambria Math" panose="02040503050406030204" pitchFamily="18" charset="0"/>
+                            </a:rPr>
+                            <m:t>1</m:t>
+                          </m:r>
+                        </m:sub>
+                      </m:sSub>
                     </m:oMath>
                   </m:oMathPara>
                 </a14:m>
@@ -7519,7 +9372,7 @@
 </p:sld>
 </file>
 
-<file path=ppt/slides/slide21.xml><?xml version="1.0" encoding="utf-8"?>
+<file path=ppt/slides/slide31.xml><?xml version="1.0" encoding="utf-8"?>
 <p:sld xmlns:a="http://schemas.openxmlformats.org/drawingml/2006/main" xmlns:r="http://schemas.openxmlformats.org/officeDocument/2006/relationships" xmlns:p="http://schemas.openxmlformats.org/presentationml/2006/main">
   <p:cSld>
     <p:spTree>
@@ -7768,18 +9621,31 @@
                                   </a:rPr>
                                   <m:t>∗</m:t>
                                 </m:r>
-                                <m:r>
-                                  <a:rPr lang="en-GB" i="1">
-                                    <a:latin typeface="Cambria Math" panose="02040503050406030204" pitchFamily="18" charset="0"/>
-                                  </a:rPr>
-                                  <m:t>𝑁</m:t>
-                                </m:r>
-                                <m:r>
-                                  <a:rPr lang="en-GB" i="1">
-                                    <a:latin typeface="Cambria Math" panose="02040503050406030204" pitchFamily="18" charset="0"/>
-                                  </a:rPr>
-                                  <m:t>1</m:t>
-                                </m:r>
+                                <m:sSub>
+                                  <m:sSubPr>
+                                    <m:ctrlPr>
+                                      <a:rPr lang="en-GB" b="0" i="1" smtClean="0">
+                                        <a:latin typeface="Cambria Math" panose="02040503050406030204" pitchFamily="18" charset="0"/>
+                                      </a:rPr>
+                                    </m:ctrlPr>
+                                  </m:sSubPr>
+                                  <m:e>
+                                    <m:r>
+                                      <a:rPr lang="en-GB" i="1">
+                                        <a:latin typeface="Cambria Math" panose="02040503050406030204" pitchFamily="18" charset="0"/>
+                                      </a:rPr>
+                                      <m:t>𝑁</m:t>
+                                    </m:r>
+                                  </m:e>
+                                  <m:sub>
+                                    <m:r>
+                                      <a:rPr lang="en-GB" i="1">
+                                        <a:latin typeface="Cambria Math" panose="02040503050406030204" pitchFamily="18" charset="0"/>
+                                      </a:rPr>
+                                      <m:t>1</m:t>
+                                    </m:r>
+                                  </m:sub>
+                                </m:sSub>
                               </m:e>
                               <m:e>
                                 <m:r>
@@ -7929,6 +9795,41 @@
                 </a14:m>
                 <a:endParaRPr lang="fr-CH" dirty="0"/>
               </a:p>
+              <a:p>
+                <a:pPr marL="0" indent="0">
+                  <a:buNone/>
+                </a:pPr>
+                <a:endParaRPr lang="fr-CH" dirty="0"/>
+              </a:p>
+              <a:p>
+                <a:pPr marL="0" indent="0">
+                  <a:buNone/>
+                </a:pPr>
+                <a:endParaRPr lang="fr-CH" dirty="0"/>
+              </a:p>
+              <a:p>
+                <a:pPr marL="0" indent="0">
+                  <a:buNone/>
+                </a:pPr>
+                <a:r>
+                  <a:rPr lang="fr-CH" dirty="0"/>
+                  <a:t>Avec </a:t>
+                </a:r>
+                <a14:m>
+                  <m:oMath xmlns:m="http://schemas.openxmlformats.org/officeDocument/2006/math">
+                    <m:r>
+                      <a:rPr lang="en-GB" b="0" i="1" smtClean="0">
+                        <a:latin typeface="Cambria Math" panose="02040503050406030204" pitchFamily="18" charset="0"/>
+                      </a:rPr>
+                      <m:t>𝑟</m:t>
+                    </m:r>
+                  </m:oMath>
+                </a14:m>
+                <a:r>
+                  <a:rPr lang="fr-CH" dirty="0"/>
+                  <a:t> qui est la taille de l’espace de l’erreur</a:t>
+                </a:r>
+              </a:p>
             </p:txBody>
           </p:sp>
         </mc:Choice>
@@ -7953,7 +9854,7 @@
               <a:blipFill>
                 <a:blip r:embed="rId2"/>
                 <a:stretch>
-                  <a:fillRect/>
+                  <a:fillRect l="-1217" b="-1961"/>
                 </a:stretch>
               </a:blipFill>
             </p:spPr>
@@ -7985,7 +9886,7 @@
 </p:sld>
 </file>
 
-<file path=ppt/slides/slide22.xml><?xml version="1.0" encoding="utf-8"?>
+<file path=ppt/slides/slide32.xml><?xml version="1.0" encoding="utf-8"?>
 <p:sld xmlns:a="http://schemas.openxmlformats.org/drawingml/2006/main" xmlns:r="http://schemas.openxmlformats.org/officeDocument/2006/relationships" xmlns:p="http://schemas.openxmlformats.org/presentationml/2006/main">
   <p:cSld>
     <p:spTree>
@@ -8030,8 +9931,8 @@
           </a:p>
         </p:txBody>
       </p:sp>
-      <mc:AlternateContent xmlns:mc="http://schemas.openxmlformats.org/markup-compatibility/2006">
-        <mc:Choice xmlns:a14="http://schemas.microsoft.com/office/drawing/2010/main" Requires="a14">
+      <mc:AlternateContent xmlns:mc="http://schemas.openxmlformats.org/markup-compatibility/2006" xmlns:a14="http://schemas.microsoft.com/office/drawing/2010/main">
+        <mc:Choice Requires="a14">
           <p:sp>
             <p:nvSpPr>
               <p:cNvPr id="3" name="Espace réservé du contenu 2">
@@ -8148,7 +10049,7 @@
             </p:txBody>
           </p:sp>
         </mc:Choice>
-        <mc:Fallback>
+        <mc:Fallback xmlns="">
           <p:sp>
             <p:nvSpPr>
               <p:cNvPr id="3" name="Espace réservé du contenu 2">
@@ -8201,7 +10102,7 @@
 </p:sld>
 </file>
 
-<file path=ppt/slides/slide23.xml><?xml version="1.0" encoding="utf-8"?>
+<file path=ppt/slides/slide33.xml><?xml version="1.0" encoding="utf-8"?>
 <p:sld xmlns:a="http://schemas.openxmlformats.org/drawingml/2006/main" xmlns:r="http://schemas.openxmlformats.org/officeDocument/2006/relationships" xmlns:p="http://schemas.openxmlformats.org/presentationml/2006/main">
   <p:cSld>
     <p:spTree>
@@ -8648,11 +10549,146 @@
                           </m:ctrlPr>
                         </m:sSubPr>
                         <m:e>
+                          <m:f>
+                            <m:fPr>
+                              <m:ctrlPr>
+                                <a:rPr lang="fr-CH" i="1" smtClean="0">
+                                  <a:latin typeface="Cambria Math" panose="02040503050406030204" pitchFamily="18" charset="0"/>
+                                </a:rPr>
+                              </m:ctrlPr>
+                            </m:fPr>
+                            <m:num>
+                              <m:sSub>
+                                <m:sSubPr>
+                                  <m:ctrlPr>
+                                    <a:rPr lang="en-GB" b="0" i="1" smtClean="0">
+                                      <a:latin typeface="Cambria Math" panose="02040503050406030204" pitchFamily="18" charset="0"/>
+                                    </a:rPr>
+                                  </m:ctrlPr>
+                                </m:sSubPr>
+                                <m:e>
+                                  <m:r>
+                                    <a:rPr lang="en-GB" i="1">
+                                      <a:latin typeface="Cambria Math" panose="02040503050406030204" pitchFamily="18" charset="0"/>
+                                    </a:rPr>
+                                    <m:t>𝑎</m:t>
+                                  </m:r>
+                                </m:e>
+                                <m:sub>
+                                  <m:r>
+                                    <a:rPr lang="en-GB" b="0" i="1" smtClean="0">
+                                      <a:latin typeface="Cambria Math" panose="02040503050406030204" pitchFamily="18" charset="0"/>
+                                    </a:rPr>
+                                    <m:t>1</m:t>
+                                  </m:r>
+                                </m:sub>
+                              </m:sSub>
+                              <m:r>
+                                <a:rPr lang="en-GB" i="1">
+                                  <a:latin typeface="Cambria Math" panose="02040503050406030204" pitchFamily="18" charset="0"/>
+                                </a:rPr>
+                                <m:t>∗ </m:t>
+                              </m:r>
+                              <m:sSup>
+                                <m:sSupPr>
+                                  <m:ctrlPr>
+                                    <a:rPr lang="en-GB" i="1">
+                                      <a:latin typeface="Cambria Math" panose="02040503050406030204" pitchFamily="18" charset="0"/>
+                                    </a:rPr>
+                                  </m:ctrlPr>
+                                </m:sSupPr>
+                                <m:e>
+                                  <m:r>
+                                    <a:rPr lang="en-GB" i="1">
+                                      <a:latin typeface="Cambria Math" panose="02040503050406030204" pitchFamily="18" charset="0"/>
+                                    </a:rPr>
+                                    <m:t>𝑥</m:t>
+                                  </m:r>
+                                </m:e>
+                                <m:sup>
+                                  <m:r>
+                                    <a:rPr lang="en-GB" i="1">
+                                      <a:latin typeface="Cambria Math" panose="02040503050406030204" pitchFamily="18" charset="0"/>
+                                    </a:rPr>
+                                    <m:t>2</m:t>
+                                  </m:r>
+                                </m:sup>
+                              </m:sSup>
+                            </m:num>
+                            <m:den>
+                              <m:sSup>
+                                <m:sSupPr>
+                                  <m:ctrlPr>
+                                    <a:rPr lang="fr-CH" i="1" smtClean="0">
+                                      <a:latin typeface="Cambria Math" panose="02040503050406030204" pitchFamily="18" charset="0"/>
+                                    </a:rPr>
+                                  </m:ctrlPr>
+                                </m:sSupPr>
+                                <m:e>
+                                  <m:r>
+                                    <a:rPr lang="en-GB" b="0" i="1" smtClean="0">
+                                      <a:latin typeface="Cambria Math" panose="02040503050406030204" pitchFamily="18" charset="0"/>
+                                    </a:rPr>
+                                    <m:t>2</m:t>
+                                  </m:r>
+                                </m:e>
+                                <m:sup>
+                                  <m:sSup>
+                                    <m:sSupPr>
+                                      <m:ctrlPr>
+                                        <a:rPr lang="pt-BR" i="1">
+                                          <a:latin typeface="Cambria Math" panose="02040503050406030204" pitchFamily="18" charset="0"/>
+                                        </a:rPr>
+                                      </m:ctrlPr>
+                                    </m:sSupPr>
+                                    <m:e>
+                                      <m:r>
+                                        <a:rPr lang="en-GB" i="1">
+                                          <a:latin typeface="Cambria Math" panose="02040503050406030204" pitchFamily="18" charset="0"/>
+                                        </a:rPr>
+                                        <m:t>2</m:t>
+                                      </m:r>
+                                    </m:e>
+                                    <m:sup>
+                                      <m:func>
+                                        <m:funcPr>
+                                          <m:ctrlPr>
+                                            <a:rPr lang="en-GB" i="1">
+                                              <a:latin typeface="Cambria Math" panose="02040503050406030204" pitchFamily="18" charset="0"/>
+                                            </a:rPr>
+                                          </m:ctrlPr>
+                                        </m:funcPr>
+                                        <m:fName>
+                                          <m:r>
+                                            <m:rPr>
+                                              <m:sty m:val="p"/>
+                                            </m:rPr>
+                                            <a:rPr lang="en-GB">
+                                              <a:latin typeface="Cambria Math" panose="02040503050406030204" pitchFamily="18" charset="0"/>
+                                            </a:rPr>
+                                            <m:t>log</m:t>
+                                          </m:r>
+                                        </m:fName>
+                                        <m:e>
+                                          <m:r>
+                                            <a:rPr lang="en-GB" i="1">
+                                              <a:latin typeface="Cambria Math" panose="02040503050406030204" pitchFamily="18" charset="0"/>
+                                            </a:rPr>
+                                            <m:t>𝑟</m:t>
+                                          </m:r>
+                                        </m:e>
+                                      </m:func>
+                                    </m:sup>
+                                  </m:sSup>
+                                </m:sup>
+                              </m:sSup>
+                            </m:den>
+                          </m:f>
                           <m:r>
-                            <a:rPr lang="en-GB" i="1">
+                            <a:rPr lang="en-GB" b="0" i="1" smtClean="0">
                               <a:latin typeface="Cambria Math" panose="02040503050406030204" pitchFamily="18" charset="0"/>
                             </a:rPr>
-                            <m:t>𝑎</m:t>
+                            <m:t>+ </m:t>
                           </m:r>
                         </m:e>
                         <m:sub>
@@ -8670,43 +10706,103 @@
                         </a:rPr>
                         <m:t>+</m:t>
                       </m:r>
-                      <m:sSub>
-                        <m:sSubPr>
+                      <m:f>
+                        <m:fPr>
                           <m:ctrlPr>
-                            <a:rPr lang="fr-CH" i="1">
+                            <a:rPr lang="pt-BR" i="1" smtClean="0">
                               <a:latin typeface="Cambria Math" panose="02040503050406030204" pitchFamily="18" charset="0"/>
                             </a:rPr>
                           </m:ctrlPr>
-                        </m:sSubPr>
-                        <m:e>
+                        </m:fPr>
+                        <m:num>
+                          <m:sSub>
+                            <m:sSubPr>
+                              <m:ctrlPr>
+                                <a:rPr lang="fr-CH" i="1">
+                                  <a:latin typeface="Cambria Math" panose="02040503050406030204" pitchFamily="18" charset="0"/>
+                                </a:rPr>
+                              </m:ctrlPr>
+                            </m:sSubPr>
+                            <m:e>
+                              <m:r>
+                                <a:rPr lang="en-GB" i="1">
+                                  <a:latin typeface="Cambria Math" panose="02040503050406030204" pitchFamily="18" charset="0"/>
+                                </a:rPr>
+                                <m:t>𝑏</m:t>
+                              </m:r>
+                            </m:e>
+                            <m:sub>
+                              <m:r>
+                                <a:rPr lang="en-GB" i="1">
+                                  <a:latin typeface="Cambria Math" panose="02040503050406030204" pitchFamily="18" charset="0"/>
+                                </a:rPr>
+                                <m:t>1</m:t>
+                              </m:r>
+                            </m:sub>
+                          </m:sSub>
                           <m:r>
                             <a:rPr lang="en-GB" i="1">
                               <a:latin typeface="Cambria Math" panose="02040503050406030204" pitchFamily="18" charset="0"/>
                             </a:rPr>
-                            <m:t>𝑏</m:t>
+                            <m:t>∗</m:t>
                           </m:r>
-                        </m:e>
-                        <m:sub>
                           <m:r>
                             <a:rPr lang="en-GB" i="1">
                               <a:latin typeface="Cambria Math" panose="02040503050406030204" pitchFamily="18" charset="0"/>
                             </a:rPr>
-                            <m:t>1</m:t>
+                            <m:t>𝑥</m:t>
                           </m:r>
-                        </m:sub>
-                      </m:sSub>
-                      <m:r>
-                        <a:rPr lang="en-GB" b="0" i="1" smtClean="0">
-                          <a:latin typeface="Cambria Math" panose="02040503050406030204" pitchFamily="18" charset="0"/>
-                        </a:rPr>
-                        <m:t>∗</m:t>
-                      </m:r>
-                      <m:r>
-                        <a:rPr lang="en-GB" b="0" i="1" smtClean="0">
-                          <a:latin typeface="Cambria Math" panose="02040503050406030204" pitchFamily="18" charset="0"/>
-                        </a:rPr>
-                        <m:t>𝑥</m:t>
-                      </m:r>
+                        </m:num>
+                        <m:den>
+                          <m:sSup>
+                            <m:sSupPr>
+                              <m:ctrlPr>
+                                <a:rPr lang="pt-BR" i="1" smtClean="0">
+                                  <a:latin typeface="Cambria Math" panose="02040503050406030204" pitchFamily="18" charset="0"/>
+                                </a:rPr>
+                              </m:ctrlPr>
+                            </m:sSupPr>
+                            <m:e>
+                              <m:r>
+                                <a:rPr lang="en-GB" b="0" i="1" smtClean="0">
+                                  <a:latin typeface="Cambria Math" panose="02040503050406030204" pitchFamily="18" charset="0"/>
+                                </a:rPr>
+                                <m:t>2</m:t>
+                              </m:r>
+                            </m:e>
+                            <m:sup>
+                              <m:func>
+                                <m:funcPr>
+                                  <m:ctrlPr>
+                                    <a:rPr lang="en-GB" b="0" i="1" smtClean="0">
+                                      <a:latin typeface="Cambria Math" panose="02040503050406030204" pitchFamily="18" charset="0"/>
+                                    </a:rPr>
+                                  </m:ctrlPr>
+                                </m:funcPr>
+                                <m:fName>
+                                  <m:r>
+                                    <m:rPr>
+                                      <m:sty m:val="p"/>
+                                    </m:rPr>
+                                    <a:rPr lang="en-GB" b="0" i="0" smtClean="0">
+                                      <a:latin typeface="Cambria Math" panose="02040503050406030204" pitchFamily="18" charset="0"/>
+                                    </a:rPr>
+                                    <m:t>log</m:t>
+                                  </m:r>
+                                </m:fName>
+                                <m:e>
+                                  <m:r>
+                                    <a:rPr lang="en-GB" b="0" i="1" smtClean="0">
+                                      <a:latin typeface="Cambria Math" panose="02040503050406030204" pitchFamily="18" charset="0"/>
+                                    </a:rPr>
+                                    <m:t>𝑟</m:t>
+                                  </m:r>
+                                </m:e>
+                              </m:func>
+                            </m:sup>
+                          </m:sSup>
+                        </m:den>
+                      </m:f>
                       <m:r>
                         <a:rPr lang="en-GB" b="0" i="1" smtClean="0">
                           <a:latin typeface="Cambria Math" panose="02040503050406030204" pitchFamily="18" charset="0"/>
@@ -8738,37 +10834,6 @@
                           </m:r>
                         </m:sub>
                       </m:sSub>
-                      <m:r>
-                        <a:rPr lang="en-GB" b="0" i="1" smtClean="0">
-                          <a:latin typeface="Cambria Math" panose="02040503050406030204" pitchFamily="18" charset="0"/>
-                        </a:rPr>
-                        <m:t>∗ </m:t>
-                      </m:r>
-                      <m:sSup>
-                        <m:sSupPr>
-                          <m:ctrlPr>
-                            <a:rPr lang="en-GB" b="0" i="1" smtClean="0">
-                              <a:latin typeface="Cambria Math" panose="02040503050406030204" pitchFamily="18" charset="0"/>
-                            </a:rPr>
-                          </m:ctrlPr>
-                        </m:sSupPr>
-                        <m:e>
-                          <m:r>
-                            <a:rPr lang="en-GB" b="0" i="1" smtClean="0">
-                              <a:latin typeface="Cambria Math" panose="02040503050406030204" pitchFamily="18" charset="0"/>
-                            </a:rPr>
-                            <m:t>𝑥</m:t>
-                          </m:r>
-                        </m:e>
-                        <m:sup>
-                          <m:r>
-                            <a:rPr lang="en-GB" b="0" i="1" smtClean="0">
-                              <a:latin typeface="Cambria Math" panose="02040503050406030204" pitchFamily="18" charset="0"/>
-                            </a:rPr>
-                            <m:t>2</m:t>
-                          </m:r>
-                        </m:sup>
-                      </m:sSup>
                     </m:oMath>
                   </m:oMathPara>
                 </a14:m>
@@ -8807,18 +10872,31 @@
                           </m:ctrlPr>
                         </m:dPr>
                         <m:e>
-                          <m:r>
-                            <a:rPr lang="en-GB" b="0" i="1" smtClean="0">
-                              <a:latin typeface="Cambria Math" panose="02040503050406030204" pitchFamily="18" charset="0"/>
-                            </a:rPr>
-                            <m:t>𝑟</m:t>
-                          </m:r>
-                          <m:r>
-                            <a:rPr lang="en-GB" b="0" i="1" smtClean="0">
-                              <a:latin typeface="Cambria Math" panose="02040503050406030204" pitchFamily="18" charset="0"/>
-                            </a:rPr>
-                            <m:t>1</m:t>
-                          </m:r>
+                          <m:sSub>
+                            <m:sSubPr>
+                              <m:ctrlPr>
+                                <a:rPr lang="en-GB" b="0" i="1" smtClean="0">
+                                  <a:latin typeface="Cambria Math" panose="02040503050406030204" pitchFamily="18" charset="0"/>
+                                </a:rPr>
+                              </m:ctrlPr>
+                            </m:sSubPr>
+                            <m:e>
+                              <m:r>
+                                <a:rPr lang="en-GB" b="0" i="1" smtClean="0">
+                                  <a:latin typeface="Cambria Math" panose="02040503050406030204" pitchFamily="18" charset="0"/>
+                                </a:rPr>
+                                <m:t>𝑟</m:t>
+                              </m:r>
+                            </m:e>
+                            <m:sub>
+                              <m:r>
+                                <a:rPr lang="en-GB" b="0" i="1" smtClean="0">
+                                  <a:latin typeface="Cambria Math" panose="02040503050406030204" pitchFamily="18" charset="0"/>
+                                </a:rPr>
+                                <m:t>1</m:t>
+                              </m:r>
+                            </m:sub>
+                          </m:sSub>
                         </m:e>
                       </m:d>
                       <m:r>
@@ -8888,7 +10966,7 @@
 </p:sld>
 </file>
 
-<file path=ppt/slides/slide24.xml><?xml version="1.0" encoding="utf-8"?>
+<file path=ppt/slides/slide34.xml><?xml version="1.0" encoding="utf-8"?>
 <p:sld xmlns:a="http://schemas.openxmlformats.org/drawingml/2006/main" xmlns:r="http://schemas.openxmlformats.org/officeDocument/2006/relationships" xmlns:p="http://schemas.openxmlformats.org/presentationml/2006/main">
   <p:cSld>
     <p:spTree>
@@ -8939,8 +11017,8 @@
           </a:p>
         </p:txBody>
       </p:sp>
-      <mc:AlternateContent xmlns:mc="http://schemas.openxmlformats.org/markup-compatibility/2006">
-        <mc:Choice xmlns:a14="http://schemas.microsoft.com/office/drawing/2010/main" Requires="a14">
+      <mc:AlternateContent xmlns:mc="http://schemas.openxmlformats.org/markup-compatibility/2006" xmlns:a14="http://schemas.microsoft.com/office/drawing/2010/main">
+        <mc:Choice Requires="a14">
           <p:sp>
             <p:nvSpPr>
               <p:cNvPr id="3" name="Espace réservé du contenu 2">
@@ -9202,7 +11280,7 @@
             </p:txBody>
           </p:sp>
         </mc:Choice>
-        <mc:Fallback>
+        <mc:Fallback xmlns="">
           <p:sp>
             <p:nvSpPr>
               <p:cNvPr id="3" name="Espace réservé du contenu 2">
@@ -9255,7 +11333,7 @@
 </p:sld>
 </file>
 
-<file path=ppt/slides/slide25.xml><?xml version="1.0" encoding="utf-8"?>
+<file path=ppt/slides/slide35.xml><?xml version="1.0" encoding="utf-8"?>
 <p:sld xmlns:a="http://schemas.openxmlformats.org/drawingml/2006/main" xmlns:r="http://schemas.openxmlformats.org/officeDocument/2006/relationships" xmlns:p="http://schemas.openxmlformats.org/presentationml/2006/main">
   <p:cSld>
     <p:spTree>
@@ -9321,7 +11399,56 @@
           <a:bodyPr/>
           <a:lstStyle/>
           <a:p>
-            <a:endParaRPr lang="fr-CH"/>
+            <a:r>
+              <a:rPr lang="fr-CH" dirty="0"/>
+              <a:t>Faire les mises à jour</a:t>
+            </a:r>
+          </a:p>
+          <a:p>
+            <a:r>
+              <a:rPr lang="fr-CH" dirty="0"/>
+              <a:t>Valider toutes les signatures avant de les envoyer</a:t>
+            </a:r>
+          </a:p>
+          <a:p>
+            <a:r>
+              <a:rPr lang="fr-CH" dirty="0"/>
+              <a:t>Ne pas utiliser PKCS#1 v1.5</a:t>
+            </a:r>
+          </a:p>
+          <a:p>
+            <a:r>
+              <a:rPr lang="fr-CH" dirty="0"/>
+              <a:t>Ne pas utiliser un </a:t>
+            </a:r>
+            <a:r>
+              <a:rPr lang="fr-CH" dirty="0" err="1"/>
+              <a:t>padding</a:t>
+            </a:r>
+            <a:r>
+              <a:rPr lang="fr-CH" dirty="0"/>
+              <a:t> déterministe</a:t>
+            </a:r>
+          </a:p>
+          <a:p>
+            <a:r>
+              <a:rPr lang="fr-CH" dirty="0"/>
+              <a:t>Protocole :</a:t>
+            </a:r>
+          </a:p>
+          <a:p>
+            <a:pPr lvl="1"/>
+            <a:r>
+              <a:rPr lang="fr-CH" dirty="0"/>
+              <a:t>Chiffrer la communication le plus tôt possible</a:t>
+            </a:r>
+          </a:p>
+          <a:p>
+            <a:pPr lvl="1"/>
+            <a:r>
+              <a:rPr lang="fr-CH" dirty="0"/>
+              <a:t>Se baser sur TLS 1.3</a:t>
+            </a:r>
           </a:p>
         </p:txBody>
       </p:sp>
@@ -9338,7 +11465,7 @@
 </p:sld>
 </file>
 
-<file path=ppt/slides/slide26.xml><?xml version="1.0" encoding="utf-8"?>
+<file path=ppt/slides/slide36.xml><?xml version="1.0" encoding="utf-8"?>
 <p:sld xmlns:a="http://schemas.openxmlformats.org/drawingml/2006/main" xmlns:r="http://schemas.openxmlformats.org/officeDocument/2006/relationships" xmlns:p="http://schemas.openxmlformats.org/presentationml/2006/main">
   <p:cSld>
     <p:spTree>
@@ -9360,7 +11487,7 @@
           <p:cNvPr id="2" name="Titre 1">
             <a:extLst>
               <a:ext uri="{FF2B5EF4-FFF2-40B4-BE49-F238E27FC236}">
-                <a16:creationId xmlns:a16="http://schemas.microsoft.com/office/drawing/2014/main" id="{CE5B3F89-73E8-F591-5459-D7C7DA9182F2}"/>
+                <a16:creationId xmlns:a16="http://schemas.microsoft.com/office/drawing/2014/main" id="{F29EA416-018F-8C12-6BA0-C0F12CD10F7D}"/>
               </a:ext>
             </a:extLst>
           </p:cNvPr>
@@ -9368,7 +11495,7 @@
             <a:spLocks noGrp="1"/>
           </p:cNvSpPr>
           <p:nvPr>
-            <p:ph type="title"/>
+            <p:ph type="ctrTitle"/>
           </p:nvPr>
         </p:nvSpPr>
         <p:spPr/>
@@ -9385,10 +11512,10 @@
       </p:sp>
       <p:sp>
         <p:nvSpPr>
-          <p:cNvPr id="3" name="Espace réservé du contenu 2">
+          <p:cNvPr id="3" name="Sous-titre 2">
             <a:extLst>
               <a:ext uri="{FF2B5EF4-FFF2-40B4-BE49-F238E27FC236}">
-                <a16:creationId xmlns:a16="http://schemas.microsoft.com/office/drawing/2014/main" id="{C183CE3D-B8CF-6FEA-B32D-72C4A3152EC7}"/>
+                <a16:creationId xmlns:a16="http://schemas.microsoft.com/office/drawing/2014/main" id="{DB50C281-F141-1C1A-0379-86C2D23A5647}"/>
               </a:ext>
             </a:extLst>
           </p:cNvPr>
@@ -9396,7 +11523,7 @@
             <a:spLocks noGrp="1"/>
           </p:cNvSpPr>
           <p:nvPr>
-            <p:ph idx="1"/>
+            <p:ph type="subTitle" idx="1"/>
           </p:nvPr>
         </p:nvSpPr>
         <p:spPr/>
@@ -9411,7 +11538,7 @@
     </p:spTree>
     <p:extLst>
       <p:ext uri="{BB962C8B-B14F-4D97-AF65-F5344CB8AC3E}">
-        <p14:creationId xmlns:p14="http://schemas.microsoft.com/office/powerpoint/2010/main" val="3188463438"/>
+        <p14:creationId xmlns:p14="http://schemas.microsoft.com/office/powerpoint/2010/main" val="722432586"/>
       </p:ext>
     </p:extLst>
   </p:cSld>
@@ -9421,7 +11548,7 @@
 </p:sld>
 </file>
 
-<file path=ppt/slides/slide27.xml><?xml version="1.0" encoding="utf-8"?>
+<file path=ppt/slides/slide37.xml><?xml version="1.0" encoding="utf-8"?>
 <p:sld xmlns:a="http://schemas.openxmlformats.org/drawingml/2006/main" xmlns:r="http://schemas.openxmlformats.org/officeDocument/2006/relationships" xmlns:p="http://schemas.openxmlformats.org/presentationml/2006/main">
   <p:cSld>
     <p:spTree>
@@ -9484,7 +11611,9 @@
         </p:nvSpPr>
         <p:spPr/>
         <p:txBody>
-          <a:bodyPr/>
+          <a:bodyPr>
+            <a:normAutofit lnSpcReduction="10000"/>
+          </a:bodyPr>
           <a:lstStyle/>
           <a:p>
             <a:r>
@@ -9585,6 +11714,17 @@
               <a:rPr lang="fr-CH" dirty="0"/>
               <a:t> [PDF]. Support de cours : Cryptographie avancée appliquée, HEIG-VD, 2024.</a:t>
             </a:r>
+          </a:p>
+          <a:p>
+            <a:r>
+              <a:rPr lang="en-GB" b="1" dirty="0"/>
+              <a:t>Tatu Ylonen.</a:t>
+            </a:r>
+            <a:r>
+              <a:rPr lang="en-GB" dirty="0"/>
+              <a:t> SSH - Secure Login Connections over the Internet. Proceedings of the 6th USENIX Security Symposium, pp. 37-42, USENIX, 1996.</a:t>
+            </a:r>
+            <a:endParaRPr lang="fr-CH" dirty="0"/>
           </a:p>
         </p:txBody>
       </p:sp>
@@ -9592,124 +11732,6 @@
     <p:extLst>
       <p:ext uri="{BB962C8B-B14F-4D97-AF65-F5344CB8AC3E}">
         <p14:creationId xmlns:p14="http://schemas.microsoft.com/office/powerpoint/2010/main" val="3148802735"/>
-      </p:ext>
-    </p:extLst>
-  </p:cSld>
-  <p:clrMapOvr>
-    <a:masterClrMapping/>
-  </p:clrMapOvr>
-</p:sld>
-</file>
-
-<file path=ppt/slides/slide3.xml><?xml version="1.0" encoding="utf-8"?>
-<p:sld xmlns:a="http://schemas.openxmlformats.org/drawingml/2006/main" xmlns:r="http://schemas.openxmlformats.org/officeDocument/2006/relationships" xmlns:p="http://schemas.openxmlformats.org/presentationml/2006/main">
-  <p:cSld>
-    <p:spTree>
-      <p:nvGrpSpPr>
-        <p:cNvPr id="1" name=""/>
-        <p:cNvGrpSpPr/>
-        <p:nvPr/>
-      </p:nvGrpSpPr>
-      <p:grpSpPr>
-        <a:xfrm>
-          <a:off x="0" y="0"/>
-          <a:ext cx="0" cy="0"/>
-          <a:chOff x="0" y="0"/>
-          <a:chExt cx="0" cy="0"/>
-        </a:xfrm>
-      </p:grpSpPr>
-      <p:sp>
-        <p:nvSpPr>
-          <p:cNvPr id="2" name="Titre 1">
-            <a:extLst>
-              <a:ext uri="{FF2B5EF4-FFF2-40B4-BE49-F238E27FC236}">
-                <a16:creationId xmlns:a16="http://schemas.microsoft.com/office/drawing/2014/main" id="{ABCA9630-E3A4-01F1-DC02-8D11AE85A440}"/>
-              </a:ext>
-            </a:extLst>
-          </p:cNvPr>
-          <p:cNvSpPr>
-            <a:spLocks noGrp="1"/>
-          </p:cNvSpPr>
-          <p:nvPr>
-            <p:ph type="title"/>
-          </p:nvPr>
-        </p:nvSpPr>
-        <p:spPr/>
-        <p:txBody>
-          <a:bodyPr/>
-          <a:lstStyle/>
-          <a:p>
-            <a:r>
-              <a:rPr lang="fr-CH" dirty="0"/>
-              <a:t>L’attaque en bref</a:t>
-            </a:r>
-          </a:p>
-        </p:txBody>
-      </p:sp>
-      <p:sp>
-        <p:nvSpPr>
-          <p:cNvPr id="3" name="Espace réservé du contenu 2">
-            <a:extLst>
-              <a:ext uri="{FF2B5EF4-FFF2-40B4-BE49-F238E27FC236}">
-                <a16:creationId xmlns:a16="http://schemas.microsoft.com/office/drawing/2014/main" id="{68FF2868-1122-9061-B5E0-99459AB4AC21}"/>
-              </a:ext>
-            </a:extLst>
-          </p:cNvPr>
-          <p:cNvSpPr>
-            <a:spLocks noGrp="1"/>
-          </p:cNvSpPr>
-          <p:nvPr>
-            <p:ph idx="1"/>
-          </p:nvPr>
-        </p:nvSpPr>
-        <p:spPr/>
-        <p:txBody>
-          <a:bodyPr/>
-          <a:lstStyle/>
-          <a:p>
-            <a:r>
-              <a:rPr lang="fr-CH" dirty="0"/>
-              <a:t>Écoute passive</a:t>
-            </a:r>
-          </a:p>
-          <a:p>
-            <a:r>
-              <a:rPr lang="fr-CH" dirty="0"/>
-              <a:t>SSH ou </a:t>
-            </a:r>
-            <a:r>
-              <a:rPr lang="fr-CH" dirty="0" err="1"/>
-              <a:t>IPsec</a:t>
-            </a:r>
-            <a:endParaRPr lang="fr-CH" dirty="0"/>
-          </a:p>
-          <a:p>
-            <a:r>
-              <a:rPr lang="fr-CH" dirty="0"/>
-              <a:t>Une signature PKCS#1 V1.5 invalide nécessaire</a:t>
-            </a:r>
-          </a:p>
-          <a:p>
-            <a:r>
-              <a:rPr lang="fr-CH" dirty="0"/>
-              <a:t>Pour un message inconnu</a:t>
-            </a:r>
-          </a:p>
-          <a:p>
-            <a:r>
-              <a:rPr lang="fr-CH" dirty="0"/>
-              <a:t>Signature calculée en utilisant le théorème des restes chinois</a:t>
-            </a:r>
-          </a:p>
-          <a:p>
-            <a:endParaRPr lang="fr-CH" dirty="0"/>
-          </a:p>
-        </p:txBody>
-      </p:sp>
-    </p:spTree>
-    <p:extLst>
-      <p:ext uri="{BB962C8B-B14F-4D97-AF65-F5344CB8AC3E}">
-        <p14:creationId xmlns:p14="http://schemas.microsoft.com/office/powerpoint/2010/main" val="167832716"/>
       </p:ext>
     </p:extLst>
   </p:cSld>
@@ -9931,6 +11953,48 @@
             </a:r>
           </a:p>
           <a:p>
+            <a:endParaRPr lang="fr-CH" dirty="0"/>
+          </a:p>
+        </p:txBody>
+      </p:sp>
+      <p:sp>
+        <p:nvSpPr>
+          <p:cNvPr id="3" name="Espace réservé du pied de page 8">
+            <a:extLst>
+              <a:ext uri="{FF2B5EF4-FFF2-40B4-BE49-F238E27FC236}">
+                <a16:creationId xmlns:a16="http://schemas.microsoft.com/office/drawing/2014/main" id="{FD4EA799-CE02-3F70-AA1E-C3DFB7931FD8}"/>
+              </a:ext>
+            </a:extLst>
+          </p:cNvPr>
+          <p:cNvSpPr>
+            <a:spLocks noGrp="1"/>
+          </p:cNvSpPr>
+          <p:nvPr>
+            <p:ph type="ftr" sz="quarter" idx="11"/>
+          </p:nvPr>
+        </p:nvSpPr>
+        <p:spPr>
+          <a:xfrm>
+            <a:off x="0" y="6356350"/>
+            <a:ext cx="8117918" cy="365125"/>
+          </a:xfrm>
+        </p:spPr>
+        <p:txBody>
+          <a:bodyPr/>
+          <a:lstStyle/>
+          <a:p>
+            <a:r>
+              <a:rPr lang="en-GB" dirty="0"/>
+              <a:t>Keegan Ryan et al. Passive SSH Key Compromise via Lattices. Cryptology </a:t>
+            </a:r>
+            <a:r>
+              <a:rPr lang="en-GB" dirty="0" err="1"/>
+              <a:t>ePrint</a:t>
+            </a:r>
+            <a:r>
+              <a:rPr lang="en-GB" dirty="0"/>
+              <a:t> Archive, Paper 2023/1711, 2023.</a:t>
+            </a:r>
             <a:endParaRPr lang="fr-CH" dirty="0"/>
           </a:p>
         </p:txBody>
@@ -10255,6 +12319,48 @@
           </a:graphicData>
         </a:graphic>
       </p:graphicFrame>
+      <p:sp>
+        <p:nvSpPr>
+          <p:cNvPr id="3" name="Espace réservé du pied de page 8">
+            <a:extLst>
+              <a:ext uri="{FF2B5EF4-FFF2-40B4-BE49-F238E27FC236}">
+                <a16:creationId xmlns:a16="http://schemas.microsoft.com/office/drawing/2014/main" id="{9F04F69C-54E3-BF74-C290-8AB238EF68E4}"/>
+              </a:ext>
+            </a:extLst>
+          </p:cNvPr>
+          <p:cNvSpPr>
+            <a:spLocks noGrp="1"/>
+          </p:cNvSpPr>
+          <p:nvPr>
+            <p:ph type="ftr" sz="quarter" idx="11"/>
+          </p:nvPr>
+        </p:nvSpPr>
+        <p:spPr>
+          <a:xfrm>
+            <a:off x="0" y="6356350"/>
+            <a:ext cx="8117918" cy="365125"/>
+          </a:xfrm>
+        </p:spPr>
+        <p:txBody>
+          <a:bodyPr/>
+          <a:lstStyle/>
+          <a:p>
+            <a:r>
+              <a:rPr lang="en-GB" dirty="0"/>
+              <a:t>Keegan Ryan et al. Passive SSH Key Compromise via Lattices. Cryptology </a:t>
+            </a:r>
+            <a:r>
+              <a:rPr lang="en-GB" dirty="0" err="1"/>
+              <a:t>ePrint</a:t>
+            </a:r>
+            <a:r>
+              <a:rPr lang="en-GB" dirty="0"/>
+              <a:t> Archive, Paper 2023/1711, 2023.</a:t>
+            </a:r>
+            <a:endParaRPr lang="fr-CH" dirty="0"/>
+          </a:p>
+        </p:txBody>
+      </p:sp>
     </p:spTree>
     <p:extLst>
       <p:ext uri="{BB962C8B-B14F-4D97-AF65-F5344CB8AC3E}">
@@ -10399,12 +12505,46 @@
           </a:p>
         </p:txBody>
       </p:sp>
+      <p:pic>
+        <p:nvPicPr>
+          <p:cNvPr id="12" name="Espace réservé du contenu 11">
+            <a:extLst>
+              <a:ext uri="{FF2B5EF4-FFF2-40B4-BE49-F238E27FC236}">
+                <a16:creationId xmlns:a16="http://schemas.microsoft.com/office/drawing/2014/main" id="{4D57BD00-275F-086A-B019-09441149799D}"/>
+              </a:ext>
+            </a:extLst>
+          </p:cNvPr>
+          <p:cNvPicPr>
+            <a:picLocks noGrp="1" noChangeAspect="1"/>
+          </p:cNvPicPr>
+          <p:nvPr>
+            <p:ph idx="1"/>
+          </p:nvPr>
+        </p:nvPicPr>
+        <p:blipFill>
+          <a:blip r:embed="rId2">
+            <a:extLst>
+              <a:ext uri="{28A0092B-C50C-407E-A947-70E740481C1C}">
+                <a14:useLocalDpi xmlns:a14="http://schemas.microsoft.com/office/drawing/2010/main" val="0"/>
+              </a:ext>
+            </a:extLst>
+          </a:blip>
+          <a:srcRect/>
+          <a:stretch/>
+        </p:blipFill>
+        <p:spPr>
+          <a:xfrm>
+            <a:off x="838200" y="2191955"/>
+            <a:ext cx="10515600" cy="3618677"/>
+          </a:xfrm>
+        </p:spPr>
+      </p:pic>
       <p:sp>
         <p:nvSpPr>
-          <p:cNvPr id="3" name="Espace réservé du contenu 2">
+          <p:cNvPr id="13" name="Espace réservé du pied de page 12">
             <a:extLst>
               <a:ext uri="{FF2B5EF4-FFF2-40B4-BE49-F238E27FC236}">
-                <a16:creationId xmlns:a16="http://schemas.microsoft.com/office/drawing/2014/main" id="{2642F217-C2B0-61EC-0CFF-94476B4C3087}"/>
+                <a16:creationId xmlns:a16="http://schemas.microsoft.com/office/drawing/2014/main" id="{2A34BFDB-8807-5D23-E09D-2F3605686511}"/>
               </a:ext>
             </a:extLst>
           </p:cNvPr>
@@ -10412,15 +12552,24 @@
             <a:spLocks noGrp="1"/>
           </p:cNvSpPr>
           <p:nvPr>
-            <p:ph idx="1"/>
+            <p:ph type="ftr" sz="quarter" idx="11"/>
           </p:nvPr>
         </p:nvSpPr>
-        <p:spPr/>
+        <p:spPr>
+          <a:xfrm>
+            <a:off x="-1" y="6356350"/>
+            <a:ext cx="9646571" cy="365125"/>
+          </a:xfrm>
+        </p:spPr>
         <p:txBody>
           <a:bodyPr/>
           <a:lstStyle/>
           <a:p>
-            <a:endParaRPr lang="fr-CH"/>
+            <a:r>
+              <a:rPr lang="en-GB" dirty="0"/>
+              <a:t>Tatu Ylonen: SSH - Secure Login Connections over the Internet. Proceedings of the 6th USENIX Security Symposium, pp. 37-42, USENIX, 1996.</a:t>
+            </a:r>
+            <a:endParaRPr lang="fr-CH" dirty="0"/>
           </a:p>
         </p:txBody>
       </p:sp>
@@ -10459,7 +12608,7 @@
           <p:cNvPr id="2" name="Titre 1">
             <a:extLst>
               <a:ext uri="{FF2B5EF4-FFF2-40B4-BE49-F238E27FC236}">
-                <a16:creationId xmlns:a16="http://schemas.microsoft.com/office/drawing/2014/main" id="{C7AA97B4-9548-A3E1-F52D-BD36A09A7DA0}"/>
+                <a16:creationId xmlns:a16="http://schemas.microsoft.com/office/drawing/2014/main" id="{34DB7913-74D7-7837-652B-6F145847D8DA}"/>
               </a:ext>
             </a:extLst>
           </p:cNvPr>
@@ -10476,10 +12625,9 @@
           <a:lstStyle/>
           <a:p>
             <a:r>
-              <a:rPr lang="fr-CH" dirty="0" err="1"/>
-              <a:t>IPsec</a:t>
-            </a:r>
-            <a:endParaRPr lang="fr-CH" dirty="0"/>
+              <a:rPr lang="fr-CH" dirty="0"/>
+              <a:t>SSH</a:t>
+            </a:r>
           </a:p>
         </p:txBody>
       </p:sp>
@@ -10488,7 +12636,7 @@
           <p:cNvPr id="3" name="Espace réservé du contenu 2">
             <a:extLst>
               <a:ext uri="{FF2B5EF4-FFF2-40B4-BE49-F238E27FC236}">
-                <a16:creationId xmlns:a16="http://schemas.microsoft.com/office/drawing/2014/main" id="{F0C10A8F-80FA-2A40-2959-EAF69F97A569}"/>
+                <a16:creationId xmlns:a16="http://schemas.microsoft.com/office/drawing/2014/main" id="{66D37A0F-FDE0-F063-4D79-9F2C94D0B35A}"/>
               </a:ext>
             </a:extLst>
           </p:cNvPr>
@@ -10504,14 +12652,105 @@
           <a:bodyPr/>
           <a:lstStyle/>
           <a:p>
-            <a:endParaRPr lang="fr-CH"/>
+            <a:pPr marL="514350" indent="-514350">
+              <a:buFont typeface="+mj-lt"/>
+              <a:buAutoNum type="arabicPeriod"/>
+            </a:pPr>
+            <a:r>
+              <a:rPr lang="fr-CH" dirty="0"/>
+              <a:t>Connection du client</a:t>
+            </a:r>
+          </a:p>
+          <a:p>
+            <a:pPr marL="514350" indent="-514350">
+              <a:buFont typeface="+mj-lt"/>
+              <a:buAutoNum type="arabicPeriod"/>
+            </a:pPr>
+            <a:r>
+              <a:rPr lang="fr-CH" dirty="0"/>
+              <a:t>Négociation des algorithmes</a:t>
+            </a:r>
+          </a:p>
+          <a:p>
+            <a:pPr marL="514350" indent="-514350">
+              <a:buFont typeface="+mj-lt"/>
+              <a:buAutoNum type="arabicPeriod"/>
+            </a:pPr>
+            <a:r>
+              <a:rPr lang="fr-CH" dirty="0"/>
+              <a:t>Échange </a:t>
+            </a:r>
+            <a:r>
+              <a:rPr lang="fr-CH" dirty="0" err="1"/>
+              <a:t>Diffie</a:t>
+            </a:r>
+            <a:r>
+              <a:rPr lang="fr-CH" dirty="0"/>
+              <a:t>-Hellman</a:t>
+            </a:r>
+          </a:p>
+          <a:p>
+            <a:pPr marL="514350" indent="-514350">
+              <a:buFont typeface="+mj-lt"/>
+              <a:buAutoNum type="arabicPeriod"/>
+            </a:pPr>
+            <a:r>
+              <a:rPr lang="fr-CH" dirty="0"/>
+              <a:t>Le serveur signe le D-H, les </a:t>
+            </a:r>
+            <a:r>
+              <a:rPr lang="fr-CH" dirty="0" err="1"/>
+              <a:t>cipher</a:t>
+            </a:r>
+            <a:r>
+              <a:rPr lang="fr-CH" dirty="0"/>
+              <a:t> suites, </a:t>
+            </a:r>
+            <a:r>
+              <a:rPr lang="fr-CH" dirty="0" err="1"/>
+              <a:t>l’id</a:t>
+            </a:r>
+            <a:r>
+              <a:rPr lang="fr-CH" dirty="0"/>
+              <a:t> client et serveur</a:t>
+            </a:r>
+          </a:p>
+          <a:p>
+            <a:pPr marL="514350" indent="-514350">
+              <a:buFont typeface="+mj-lt"/>
+              <a:buAutoNum type="arabicPeriod"/>
+            </a:pPr>
+            <a:r>
+              <a:rPr lang="fr-CH" dirty="0"/>
+              <a:t>Signature envoyée en clair</a:t>
+            </a:r>
+          </a:p>
+          <a:p>
+            <a:pPr marL="514350" indent="-514350">
+              <a:buFont typeface="+mj-lt"/>
+              <a:buAutoNum type="arabicPeriod"/>
+            </a:pPr>
+            <a:r>
+              <a:rPr lang="fr-CH" dirty="0"/>
+              <a:t>Établissement du canal chiffré</a:t>
+            </a:r>
+          </a:p>
+          <a:p>
+            <a:pPr marL="514350" indent="-514350">
+              <a:buFont typeface="+mj-lt"/>
+              <a:buAutoNum type="arabicPeriod"/>
+            </a:pPr>
+            <a:r>
+              <a:rPr lang="fr-CH" dirty="0"/>
+              <a:t>Authentification du client</a:t>
+            </a:r>
           </a:p>
         </p:txBody>
       </p:sp>
     </p:spTree>
     <p:extLst>
       <p:ext uri="{BB962C8B-B14F-4D97-AF65-F5344CB8AC3E}">
-        <p14:creationId xmlns:p14="http://schemas.microsoft.com/office/powerpoint/2010/main" val="1917608397"/>
+        <p14:creationId xmlns:p14="http://schemas.microsoft.com/office/powerpoint/2010/main" val="2074329008"/>
       </p:ext>
     </p:extLst>
   </p:cSld>

</xml_diff>

<commit_message>
update report and demo
</commit_message>
<xml_diff>
--- a/SSELaticeAttackFerrara.pptx
+++ b/SSELaticeAttackFerrara.pptx
@@ -5,10 +5,10 @@
     <p:sldMasterId id="2147483648" r:id="rId1"/>
   </p:sldMasterIdLst>
   <p:notesMasterIdLst>
-    <p:notesMasterId r:id="rId39"/>
+    <p:notesMasterId r:id="rId40"/>
   </p:notesMasterIdLst>
   <p:handoutMasterIdLst>
-    <p:handoutMasterId r:id="rId40"/>
+    <p:handoutMasterId r:id="rId41"/>
   </p:handoutMasterIdLst>
   <p:sldIdLst>
     <p:sldId id="256" r:id="rId2"/>
@@ -46,8 +46,9 @@
     <p:sldId id="280" r:id="rId34"/>
     <p:sldId id="281" r:id="rId35"/>
     <p:sldId id="269" r:id="rId36"/>
-    <p:sldId id="296" r:id="rId37"/>
-    <p:sldId id="270" r:id="rId38"/>
+    <p:sldId id="297" r:id="rId37"/>
+    <p:sldId id="296" r:id="rId38"/>
+    <p:sldId id="270" r:id="rId39"/>
   </p:sldIdLst>
   <p:sldSz cx="12192000" cy="6858000"/>
   <p:notesSz cx="6858000" cy="9144000"/>
@@ -248,7 +249,7 @@
           <a:p>
             <a:fld id="{E119955A-8F8B-4836-9D5D-75BC53B05DFA}" type="datetimeFigureOut">
               <a:rPr lang="fr-CH" smtClean="0"/>
-              <a:t>14.03.2025</a:t>
+              <a:t>16.03.2025</a:t>
             </a:fld>
             <a:endParaRPr lang="fr-CH"/>
           </a:p>
@@ -425,7 +426,7 @@
           <a:p>
             <a:fld id="{4B7F84FC-00BA-4296-9B1E-E241E38FBA94}" type="datetimeFigureOut">
               <a:rPr lang="fr-CH" smtClean="0"/>
-              <a:t>14.03.2025</a:t>
+              <a:t>16.03.2025</a:t>
             </a:fld>
             <a:endParaRPr lang="fr-CH"/>
           </a:p>
@@ -842,7 +843,7 @@
           <a:p>
             <a:fld id="{F57DD76F-4C7B-46A7-B9DC-35AD90C344BA}" type="datetimeFigureOut">
               <a:rPr lang="fr-CH" smtClean="0"/>
-              <a:t>14.03.2025</a:t>
+              <a:t>16.03.2025</a:t>
             </a:fld>
             <a:endParaRPr lang="fr-CH"/>
           </a:p>
@@ -1042,7 +1043,7 @@
           <a:p>
             <a:fld id="{F57DD76F-4C7B-46A7-B9DC-35AD90C344BA}" type="datetimeFigureOut">
               <a:rPr lang="fr-CH" smtClean="0"/>
-              <a:t>14.03.2025</a:t>
+              <a:t>16.03.2025</a:t>
             </a:fld>
             <a:endParaRPr lang="fr-CH"/>
           </a:p>
@@ -1252,7 +1253,7 @@
           <a:p>
             <a:fld id="{F57DD76F-4C7B-46A7-B9DC-35AD90C344BA}" type="datetimeFigureOut">
               <a:rPr lang="fr-CH" smtClean="0"/>
-              <a:t>14.03.2025</a:t>
+              <a:t>16.03.2025</a:t>
             </a:fld>
             <a:endParaRPr lang="fr-CH"/>
           </a:p>
@@ -1452,7 +1453,7 @@
           <a:p>
             <a:fld id="{F57DD76F-4C7B-46A7-B9DC-35AD90C344BA}" type="datetimeFigureOut">
               <a:rPr lang="fr-CH" smtClean="0"/>
-              <a:t>14.03.2025</a:t>
+              <a:t>16.03.2025</a:t>
             </a:fld>
             <a:endParaRPr lang="fr-CH"/>
           </a:p>
@@ -1728,7 +1729,7 @@
           <a:p>
             <a:fld id="{F57DD76F-4C7B-46A7-B9DC-35AD90C344BA}" type="datetimeFigureOut">
               <a:rPr lang="fr-CH" smtClean="0"/>
-              <a:t>14.03.2025</a:t>
+              <a:t>16.03.2025</a:t>
             </a:fld>
             <a:endParaRPr lang="fr-CH"/>
           </a:p>
@@ -1996,7 +1997,7 @@
           <a:p>
             <a:fld id="{F57DD76F-4C7B-46A7-B9DC-35AD90C344BA}" type="datetimeFigureOut">
               <a:rPr lang="fr-CH" smtClean="0"/>
-              <a:t>14.03.2025</a:t>
+              <a:t>16.03.2025</a:t>
             </a:fld>
             <a:endParaRPr lang="fr-CH"/>
           </a:p>
@@ -2411,7 +2412,7 @@
           <a:p>
             <a:fld id="{F57DD76F-4C7B-46A7-B9DC-35AD90C344BA}" type="datetimeFigureOut">
               <a:rPr lang="fr-CH" smtClean="0"/>
-              <a:t>14.03.2025</a:t>
+              <a:t>16.03.2025</a:t>
             </a:fld>
             <a:endParaRPr lang="fr-CH"/>
           </a:p>
@@ -2553,7 +2554,7 @@
           <a:p>
             <a:fld id="{F57DD76F-4C7B-46A7-B9DC-35AD90C344BA}" type="datetimeFigureOut">
               <a:rPr lang="fr-CH" smtClean="0"/>
-              <a:t>14.03.2025</a:t>
+              <a:t>16.03.2025</a:t>
             </a:fld>
             <a:endParaRPr lang="fr-CH"/>
           </a:p>
@@ -2666,7 +2667,7 @@
           <a:p>
             <a:fld id="{F57DD76F-4C7B-46A7-B9DC-35AD90C344BA}" type="datetimeFigureOut">
               <a:rPr lang="fr-CH" smtClean="0"/>
-              <a:t>14.03.2025</a:t>
+              <a:t>16.03.2025</a:t>
             </a:fld>
             <a:endParaRPr lang="fr-CH"/>
           </a:p>
@@ -2979,7 +2980,7 @@
           <a:p>
             <a:fld id="{F57DD76F-4C7B-46A7-B9DC-35AD90C344BA}" type="datetimeFigureOut">
               <a:rPr lang="fr-CH" smtClean="0"/>
-              <a:t>14.03.2025</a:t>
+              <a:t>16.03.2025</a:t>
             </a:fld>
             <a:endParaRPr lang="fr-CH"/>
           </a:p>
@@ -3268,7 +3269,7 @@
           <a:p>
             <a:fld id="{F57DD76F-4C7B-46A7-B9DC-35AD90C344BA}" type="datetimeFigureOut">
               <a:rPr lang="fr-CH" smtClean="0"/>
-              <a:t>14.03.2025</a:t>
+              <a:t>16.03.2025</a:t>
             </a:fld>
             <a:endParaRPr lang="fr-CH"/>
           </a:p>
@@ -3511,7 +3512,7 @@
           <a:p>
             <a:fld id="{F57DD76F-4C7B-46A7-B9DC-35AD90C344BA}" type="datetimeFigureOut">
               <a:rPr lang="fr-CH" smtClean="0"/>
-              <a:t>14.03.2025</a:t>
+              <a:t>16.03.2025</a:t>
             </a:fld>
             <a:endParaRPr lang="fr-CH"/>
           </a:p>
@@ -5476,8 +5477,8 @@
           </a:p>
         </p:txBody>
       </p:sp>
-      <mc:AlternateContent xmlns:mc="http://schemas.openxmlformats.org/markup-compatibility/2006">
-        <mc:Choice xmlns:a14="http://schemas.microsoft.com/office/drawing/2010/main" Requires="a14">
+      <mc:AlternateContent xmlns:mc="http://schemas.openxmlformats.org/markup-compatibility/2006" xmlns:a14="http://schemas.microsoft.com/office/drawing/2010/main">
+        <mc:Choice Requires="a14">
           <p:sp>
             <p:nvSpPr>
               <p:cNvPr id="3" name="Espace réservé du contenu 2">
@@ -5903,7 +5904,7 @@
             </p:txBody>
           </p:sp>
         </mc:Choice>
-        <mc:Fallback>
+        <mc:Fallback xmlns="">
           <p:sp>
             <p:nvSpPr>
               <p:cNvPr id="3" name="Espace réservé du contenu 2">
@@ -6241,8 +6242,8 @@
           </a:p>
         </p:txBody>
       </p:sp>
-      <mc:AlternateContent xmlns:mc="http://schemas.openxmlformats.org/markup-compatibility/2006">
-        <mc:Choice xmlns:a14="http://schemas.microsoft.com/office/drawing/2010/main" Requires="a14">
+      <mc:AlternateContent xmlns:mc="http://schemas.openxmlformats.org/markup-compatibility/2006" xmlns:a14="http://schemas.microsoft.com/office/drawing/2010/main">
+        <mc:Choice Requires="a14">
           <p:sp>
             <p:nvSpPr>
               <p:cNvPr id="3" name="Espace réservé du contenu 2">
@@ -6403,7 +6404,7 @@
             </p:txBody>
           </p:sp>
         </mc:Choice>
-        <mc:Fallback>
+        <mc:Fallback xmlns="">
           <p:sp>
             <p:nvSpPr>
               <p:cNvPr id="3" name="Espace réservé du contenu 2">
@@ -6501,8 +6502,8 @@
           </a:p>
         </p:txBody>
       </p:sp>
-      <mc:AlternateContent xmlns:mc="http://schemas.openxmlformats.org/markup-compatibility/2006">
-        <mc:Choice xmlns:a14="http://schemas.microsoft.com/office/drawing/2010/main" Requires="a14">
+      <mc:AlternateContent xmlns:mc="http://schemas.openxmlformats.org/markup-compatibility/2006" xmlns:a14="http://schemas.microsoft.com/office/drawing/2010/main">
+        <mc:Choice Requires="a14">
           <p:sp>
             <p:nvSpPr>
               <p:cNvPr id="3" name="Espace réservé du contenu 2">
@@ -6934,7 +6935,7 @@
             </p:txBody>
           </p:sp>
         </mc:Choice>
-        <mc:Fallback>
+        <mc:Fallback xmlns="">
           <p:sp>
             <p:nvSpPr>
               <p:cNvPr id="3" name="Espace réservé du contenu 2">
@@ -7038,8 +7039,8 @@
           </a:p>
         </p:txBody>
       </p:sp>
-      <mc:AlternateContent xmlns:mc="http://schemas.openxmlformats.org/markup-compatibility/2006">
-        <mc:Choice xmlns:a14="http://schemas.microsoft.com/office/drawing/2010/main" Requires="a14">
+      <mc:AlternateContent xmlns:mc="http://schemas.openxmlformats.org/markup-compatibility/2006" xmlns:a14="http://schemas.microsoft.com/office/drawing/2010/main">
+        <mc:Choice Requires="a14">
           <p:sp>
             <p:nvSpPr>
               <p:cNvPr id="3" name="Espace réservé du contenu 2">
@@ -7476,7 +7477,7 @@
             </p:txBody>
           </p:sp>
         </mc:Choice>
-        <mc:Fallback>
+        <mc:Fallback xmlns="">
           <p:sp>
             <p:nvSpPr>
               <p:cNvPr id="3" name="Espace réservé du contenu 2">
@@ -8208,8 +8209,8 @@
           </a:p>
         </p:txBody>
       </p:sp>
-      <mc:AlternateContent xmlns:mc="http://schemas.openxmlformats.org/markup-compatibility/2006">
-        <mc:Choice xmlns:a14="http://schemas.microsoft.com/office/drawing/2010/main" Requires="a14">
+      <mc:AlternateContent xmlns:mc="http://schemas.openxmlformats.org/markup-compatibility/2006" xmlns:a14="http://schemas.microsoft.com/office/drawing/2010/main">
+        <mc:Choice Requires="a14">
           <p:sp>
             <p:nvSpPr>
               <p:cNvPr id="3" name="Espace réservé du contenu 2">
@@ -8475,7 +8476,7 @@
             </p:txBody>
           </p:sp>
         </mc:Choice>
-        <mc:Fallback>
+        <mc:Fallback xmlns="">
           <p:sp>
             <p:nvSpPr>
               <p:cNvPr id="3" name="Espace réservé du contenu 2">
@@ -9026,8 +9027,8 @@
           </a:p>
         </p:txBody>
       </p:sp>
-      <mc:AlternateContent xmlns:mc="http://schemas.openxmlformats.org/markup-compatibility/2006">
-        <mc:Choice xmlns:a14="http://schemas.microsoft.com/office/drawing/2010/main" Requires="a14">
+      <mc:AlternateContent xmlns:mc="http://schemas.openxmlformats.org/markup-compatibility/2006" xmlns:a14="http://schemas.microsoft.com/office/drawing/2010/main">
+        <mc:Choice Requires="a14">
           <p:sp>
             <p:nvSpPr>
               <p:cNvPr id="3" name="Espace réservé du contenu 2">
@@ -9319,7 +9320,7 @@
             </p:txBody>
           </p:sp>
         </mc:Choice>
-        <mc:Fallback>
+        <mc:Fallback xmlns="">
           <p:sp>
             <p:nvSpPr>
               <p:cNvPr id="3" name="Espace réservé du contenu 2">
@@ -9418,8 +9419,8 @@
           </a:p>
         </p:txBody>
       </p:sp>
-      <mc:AlternateContent xmlns:mc="http://schemas.openxmlformats.org/markup-compatibility/2006">
-        <mc:Choice xmlns:a14="http://schemas.microsoft.com/office/drawing/2010/main" Requires="a14">
+      <mc:AlternateContent xmlns:mc="http://schemas.openxmlformats.org/markup-compatibility/2006" xmlns:a14="http://schemas.microsoft.com/office/drawing/2010/main">
+        <mc:Choice Requires="a14">
           <p:sp>
             <p:nvSpPr>
               <p:cNvPr id="3" name="Espace réservé du contenu 2">
@@ -9833,7 +9834,7 @@
             </p:txBody>
           </p:sp>
         </mc:Choice>
-        <mc:Fallback>
+        <mc:Fallback xmlns="">
           <p:sp>
             <p:nvSpPr>
               <p:cNvPr id="3" name="Espace réservé du contenu 2">
@@ -10540,59 +10541,94 @@
                         </a:rPr>
                         <m:t>=</m:t>
                       </m:r>
-                      <m:sSub>
-                        <m:sSubPr>
+                      <m:f>
+                        <m:fPr>
                           <m:ctrlPr>
-                            <a:rPr lang="fr-CH" i="1">
+                            <a:rPr lang="fr-CH" i="1" smtClean="0">
                               <a:latin typeface="Cambria Math" panose="02040503050406030204" pitchFamily="18" charset="0"/>
                             </a:rPr>
                           </m:ctrlPr>
-                        </m:sSubPr>
-                        <m:e>
-                          <m:f>
-                            <m:fPr>
+                        </m:fPr>
+                        <m:num>
+                          <m:sSub>
+                            <m:sSubPr>
+                              <m:ctrlPr>
+                                <a:rPr lang="en-GB" b="0" i="1" smtClean="0">
+                                  <a:latin typeface="Cambria Math" panose="02040503050406030204" pitchFamily="18" charset="0"/>
+                                </a:rPr>
+                              </m:ctrlPr>
+                            </m:sSubPr>
+                            <m:e>
+                              <m:r>
+                                <a:rPr lang="en-GB" i="1">
+                                  <a:latin typeface="Cambria Math" panose="02040503050406030204" pitchFamily="18" charset="0"/>
+                                </a:rPr>
+                                <m:t>𝑎</m:t>
+                              </m:r>
+                            </m:e>
+                            <m:sub>
+                              <m:r>
+                                <a:rPr lang="en-GB" b="0" i="1" smtClean="0">
+                                  <a:latin typeface="Cambria Math" panose="02040503050406030204" pitchFamily="18" charset="0"/>
+                                </a:rPr>
+                                <m:t>1</m:t>
+                              </m:r>
+                            </m:sub>
+                          </m:sSub>
+                          <m:r>
+                            <a:rPr lang="en-GB" i="1">
+                              <a:latin typeface="Cambria Math" panose="02040503050406030204" pitchFamily="18" charset="0"/>
+                            </a:rPr>
+                            <m:t>∗ </m:t>
+                          </m:r>
+                          <m:sSup>
+                            <m:sSupPr>
+                              <m:ctrlPr>
+                                <a:rPr lang="en-GB" i="1">
+                                  <a:latin typeface="Cambria Math" panose="02040503050406030204" pitchFamily="18" charset="0"/>
+                                </a:rPr>
+                              </m:ctrlPr>
+                            </m:sSupPr>
+                            <m:e>
+                              <m:r>
+                                <a:rPr lang="en-GB" i="1">
+                                  <a:latin typeface="Cambria Math" panose="02040503050406030204" pitchFamily="18" charset="0"/>
+                                </a:rPr>
+                                <m:t>𝑥</m:t>
+                              </m:r>
+                            </m:e>
+                            <m:sup>
+                              <m:r>
+                                <a:rPr lang="en-GB" i="1">
+                                  <a:latin typeface="Cambria Math" panose="02040503050406030204" pitchFamily="18" charset="0"/>
+                                </a:rPr>
+                                <m:t>2</m:t>
+                              </m:r>
+                            </m:sup>
+                          </m:sSup>
+                        </m:num>
+                        <m:den>
+                          <m:sSup>
+                            <m:sSupPr>
                               <m:ctrlPr>
                                 <a:rPr lang="fr-CH" i="1" smtClean="0">
                                   <a:latin typeface="Cambria Math" panose="02040503050406030204" pitchFamily="18" charset="0"/>
                                 </a:rPr>
                               </m:ctrlPr>
-                            </m:fPr>
-                            <m:num>
-                              <m:sSub>
-                                <m:sSubPr>
-                                  <m:ctrlPr>
-                                    <a:rPr lang="en-GB" b="0" i="1" smtClean="0">
-                                      <a:latin typeface="Cambria Math" panose="02040503050406030204" pitchFamily="18" charset="0"/>
-                                    </a:rPr>
-                                  </m:ctrlPr>
-                                </m:sSubPr>
-                                <m:e>
-                                  <m:r>
-                                    <a:rPr lang="en-GB" i="1">
-                                      <a:latin typeface="Cambria Math" panose="02040503050406030204" pitchFamily="18" charset="0"/>
-                                    </a:rPr>
-                                    <m:t>𝑎</m:t>
-                                  </m:r>
-                                </m:e>
-                                <m:sub>
-                                  <m:r>
-                                    <a:rPr lang="en-GB" b="0" i="1" smtClean="0">
-                                      <a:latin typeface="Cambria Math" panose="02040503050406030204" pitchFamily="18" charset="0"/>
-                                    </a:rPr>
-                                    <m:t>1</m:t>
-                                  </m:r>
-                                </m:sub>
-                              </m:sSub>
+                            </m:sSupPr>
+                            <m:e>
                               <m:r>
-                                <a:rPr lang="en-GB" i="1">
+                                <a:rPr lang="en-GB" b="0" i="1" smtClean="0">
                                   <a:latin typeface="Cambria Math" panose="02040503050406030204" pitchFamily="18" charset="0"/>
                                 </a:rPr>
-                                <m:t>∗ </m:t>
+                                <m:t>2</m:t>
                               </m:r>
+                            </m:e>
+                            <m:sup>
                               <m:sSup>
                                 <m:sSupPr>
                                   <m:ctrlPr>
-                                    <a:rPr lang="en-GB" i="1">
+                                    <a:rPr lang="pt-BR" i="1">
                                       <a:latin typeface="Cambria Math" panose="02040503050406030204" pitchFamily="18" charset="0"/>
                                     </a:rPr>
                                   </m:ctrlPr>
@@ -10602,104 +10638,50 @@
                                     <a:rPr lang="en-GB" i="1">
                                       <a:latin typeface="Cambria Math" panose="02040503050406030204" pitchFamily="18" charset="0"/>
                                     </a:rPr>
-                                    <m:t>𝑥</m:t>
-                                  </m:r>
-                                </m:e>
-                                <m:sup>
-                                  <m:r>
-                                    <a:rPr lang="en-GB" i="1">
-                                      <a:latin typeface="Cambria Math" panose="02040503050406030204" pitchFamily="18" charset="0"/>
-                                    </a:rPr>
-                                    <m:t>2</m:t>
-                                  </m:r>
-                                </m:sup>
-                              </m:sSup>
-                            </m:num>
-                            <m:den>
-                              <m:sSup>
-                                <m:sSupPr>
-                                  <m:ctrlPr>
-                                    <a:rPr lang="fr-CH" i="1" smtClean="0">
-                                      <a:latin typeface="Cambria Math" panose="02040503050406030204" pitchFamily="18" charset="0"/>
-                                    </a:rPr>
-                                  </m:ctrlPr>
-                                </m:sSupPr>
-                                <m:e>
-                                  <m:r>
-                                    <a:rPr lang="en-GB" b="0" i="1" smtClean="0">
-                                      <a:latin typeface="Cambria Math" panose="02040503050406030204" pitchFamily="18" charset="0"/>
-                                    </a:rPr>
                                     <m:t>2</m:t>
                                   </m:r>
                                 </m:e>
                                 <m:sup>
-                                  <m:sSup>
-                                    <m:sSupPr>
+                                  <m:func>
+                                    <m:funcPr>
                                       <m:ctrlPr>
-                                        <a:rPr lang="pt-BR" i="1">
+                                        <a:rPr lang="en-GB" i="1">
                                           <a:latin typeface="Cambria Math" panose="02040503050406030204" pitchFamily="18" charset="0"/>
                                         </a:rPr>
                                       </m:ctrlPr>
-                                    </m:sSupPr>
+                                    </m:funcPr>
+                                    <m:fName>
+                                      <m:r>
+                                        <m:rPr>
+                                          <m:sty m:val="p"/>
+                                        </m:rPr>
+                                        <a:rPr lang="en-GB">
+                                          <a:latin typeface="Cambria Math" panose="02040503050406030204" pitchFamily="18" charset="0"/>
+                                        </a:rPr>
+                                        <m:t>log</m:t>
+                                      </m:r>
+                                    </m:fName>
                                     <m:e>
                                       <m:r>
                                         <a:rPr lang="en-GB" i="1">
                                           <a:latin typeface="Cambria Math" panose="02040503050406030204" pitchFamily="18" charset="0"/>
                                         </a:rPr>
-                                        <m:t>2</m:t>
+                                        <m:t>𝑟</m:t>
                                       </m:r>
                                     </m:e>
-                                    <m:sup>
-                                      <m:func>
-                                        <m:funcPr>
-                                          <m:ctrlPr>
-                                            <a:rPr lang="en-GB" i="1">
-                                              <a:latin typeface="Cambria Math" panose="02040503050406030204" pitchFamily="18" charset="0"/>
-                                            </a:rPr>
-                                          </m:ctrlPr>
-                                        </m:funcPr>
-                                        <m:fName>
-                                          <m:r>
-                                            <m:rPr>
-                                              <m:sty m:val="p"/>
-                                            </m:rPr>
-                                            <a:rPr lang="en-GB">
-                                              <a:latin typeface="Cambria Math" panose="02040503050406030204" pitchFamily="18" charset="0"/>
-                                            </a:rPr>
-                                            <m:t>log</m:t>
-                                          </m:r>
-                                        </m:fName>
-                                        <m:e>
-                                          <m:r>
-                                            <a:rPr lang="en-GB" i="1">
-                                              <a:latin typeface="Cambria Math" panose="02040503050406030204" pitchFamily="18" charset="0"/>
-                                            </a:rPr>
-                                            <m:t>𝑟</m:t>
-                                          </m:r>
-                                        </m:e>
-                                      </m:func>
-                                    </m:sup>
-                                  </m:sSup>
+                                  </m:func>
                                 </m:sup>
                               </m:sSup>
-                            </m:den>
-                          </m:f>
-                          <m:r>
-                            <a:rPr lang="en-GB" b="0" i="1" smtClean="0">
-                              <a:latin typeface="Cambria Math" panose="02040503050406030204" pitchFamily="18" charset="0"/>
-                            </a:rPr>
-                            <m:t>+ </m:t>
-                          </m:r>
-                        </m:e>
-                        <m:sub>
-                          <m:r>
-                            <a:rPr lang="en-GB" i="1">
-                              <a:latin typeface="Cambria Math" panose="02040503050406030204" pitchFamily="18" charset="0"/>
-                            </a:rPr>
-                            <m:t>1</m:t>
-                          </m:r>
-                        </m:sub>
-                      </m:sSub>
+                            </m:sup>
+                          </m:sSup>
+                        </m:den>
+                      </m:f>
+                      <m:r>
+                        <a:rPr lang="en-GB" b="0" i="1" smtClean="0">
+                          <a:latin typeface="Cambria Math" panose="02040503050406030204" pitchFamily="18" charset="0"/>
+                        </a:rPr>
+                        <m:t> </m:t>
+                      </m:r>
                       <m:r>
                         <a:rPr lang="pt-BR" i="1" smtClean="0">
                           <a:latin typeface="Cambria Math" panose="02040503050406030204" pitchFamily="18" charset="0"/>
@@ -11470,6 +11452,147 @@
   <p:cSld>
     <p:spTree>
       <p:nvGrpSpPr>
+        <p:cNvPr id="1" name="">
+          <a:extLst>
+            <a:ext uri="{FF2B5EF4-FFF2-40B4-BE49-F238E27FC236}">
+              <a16:creationId xmlns:a16="http://schemas.microsoft.com/office/drawing/2014/main" id="{56A05C18-F7C5-3038-FACD-B0B50AF1F176}"/>
+            </a:ext>
+          </a:extLst>
+        </p:cNvPr>
+        <p:cNvGrpSpPr/>
+        <p:nvPr/>
+      </p:nvGrpSpPr>
+      <p:grpSpPr>
+        <a:xfrm>
+          <a:off x="0" y="0"/>
+          <a:ext cx="0" cy="0"/>
+          <a:chOff x="0" y="0"/>
+          <a:chExt cx="0" cy="0"/>
+        </a:xfrm>
+      </p:grpSpPr>
+      <p:sp>
+        <p:nvSpPr>
+          <p:cNvPr id="2" name="Titre 1">
+            <a:extLst>
+              <a:ext uri="{FF2B5EF4-FFF2-40B4-BE49-F238E27FC236}">
+                <a16:creationId xmlns:a16="http://schemas.microsoft.com/office/drawing/2014/main" id="{A6B0782A-FC51-6C5A-E65A-E20569D76FEA}"/>
+              </a:ext>
+            </a:extLst>
+          </p:cNvPr>
+          <p:cNvSpPr>
+            <a:spLocks noGrp="1"/>
+          </p:cNvSpPr>
+          <p:nvPr>
+            <p:ph type="title"/>
+          </p:nvPr>
+        </p:nvSpPr>
+        <p:spPr/>
+        <p:txBody>
+          <a:bodyPr/>
+          <a:lstStyle/>
+          <a:p>
+            <a:r>
+              <a:rPr lang="fr-CH" dirty="0"/>
+              <a:t>Mesures de protections – TLS 1.3</a:t>
+            </a:r>
+          </a:p>
+        </p:txBody>
+      </p:sp>
+      <p:pic>
+        <p:nvPicPr>
+          <p:cNvPr id="5" name="Espace réservé du contenu 4" descr="Une image contenant texte, capture d’écran, Police, ligne&#10;&#10;Le contenu généré par l’IA peut être incorrect.">
+            <a:extLst>
+              <a:ext uri="{FF2B5EF4-FFF2-40B4-BE49-F238E27FC236}">
+                <a16:creationId xmlns:a16="http://schemas.microsoft.com/office/drawing/2014/main" id="{FFF6A9A9-EF9F-04EB-413C-0DEF144FD415}"/>
+              </a:ext>
+            </a:extLst>
+          </p:cNvPr>
+          <p:cNvPicPr>
+            <a:picLocks noGrp="1" noChangeAspect="1"/>
+          </p:cNvPicPr>
+          <p:nvPr>
+            <p:ph idx="1"/>
+          </p:nvPr>
+        </p:nvPicPr>
+        <p:blipFill>
+          <a:blip r:embed="rId2">
+            <a:extLst>
+              <a:ext uri="{28A0092B-C50C-407E-A947-70E740481C1C}">
+                <a14:useLocalDpi xmlns:a14="http://schemas.microsoft.com/office/drawing/2010/main" val="0"/>
+              </a:ext>
+            </a:extLst>
+          </a:blip>
+          <a:stretch>
+            <a:fillRect/>
+          </a:stretch>
+        </p:blipFill>
+        <p:spPr>
+          <a:xfrm>
+            <a:off x="1759418" y="1298308"/>
+            <a:ext cx="8673164" cy="4878655"/>
+          </a:xfrm>
+        </p:spPr>
+      </p:pic>
+      <p:sp>
+        <p:nvSpPr>
+          <p:cNvPr id="6" name="Espace réservé du pied de page 5">
+            <a:extLst>
+              <a:ext uri="{FF2B5EF4-FFF2-40B4-BE49-F238E27FC236}">
+                <a16:creationId xmlns:a16="http://schemas.microsoft.com/office/drawing/2014/main" id="{3530B95A-3188-5B5F-7EEB-40BB8B03104D}"/>
+              </a:ext>
+            </a:extLst>
+          </p:cNvPr>
+          <p:cNvSpPr>
+            <a:spLocks noGrp="1"/>
+          </p:cNvSpPr>
+          <p:nvPr>
+            <p:ph type="ftr" sz="quarter" idx="11"/>
+          </p:nvPr>
+        </p:nvSpPr>
+        <p:spPr>
+          <a:xfrm>
+            <a:off x="0" y="6356350"/>
+            <a:ext cx="5130412" cy="365125"/>
+          </a:xfrm>
+        </p:spPr>
+        <p:txBody>
+          <a:bodyPr/>
+          <a:lstStyle/>
+          <a:p>
+            <a:r>
+              <a:rPr lang="en-GB" dirty="0"/>
+              <a:t>David Evans: cs6501, </a:t>
+            </a:r>
+            <a:r>
+              <a:rPr lang="en-GB" dirty="0" err="1"/>
+              <a:t>TLSeminar</a:t>
+            </a:r>
+            <a:r>
+              <a:rPr lang="en-GB" dirty="0"/>
+              <a:t>. University of Virginia, Spring 2017.</a:t>
+            </a:r>
+            <a:endParaRPr lang="fr-CH" dirty="0"/>
+          </a:p>
+        </p:txBody>
+      </p:sp>
+    </p:spTree>
+    <p:extLst>
+      <p:ext uri="{BB962C8B-B14F-4D97-AF65-F5344CB8AC3E}">
+        <p14:creationId xmlns:p14="http://schemas.microsoft.com/office/powerpoint/2010/main" val="1757375819"/>
+      </p:ext>
+    </p:extLst>
+  </p:cSld>
+  <p:clrMapOvr>
+    <a:masterClrMapping/>
+  </p:clrMapOvr>
+</p:sld>
+</file>
+
+<file path=ppt/slides/slide37.xml><?xml version="1.0" encoding="utf-8"?>
+<p:sld xmlns:a="http://schemas.openxmlformats.org/drawingml/2006/main" xmlns:r="http://schemas.openxmlformats.org/officeDocument/2006/relationships" xmlns:p="http://schemas.openxmlformats.org/presentationml/2006/main">
+  <p:cSld>
+    <p:spTree>
+      <p:nvGrpSpPr>
         <p:cNvPr id="1" name=""/>
         <p:cNvGrpSpPr/>
         <p:nvPr/>
@@ -11548,7 +11671,7 @@
 </p:sld>
 </file>
 
-<file path=ppt/slides/slide37.xml><?xml version="1.0" encoding="utf-8"?>
+<file path=ppt/slides/slide38.xml><?xml version="1.0" encoding="utf-8"?>
 <p:sld xmlns:a="http://schemas.openxmlformats.org/drawingml/2006/main" xmlns:r="http://schemas.openxmlformats.org/officeDocument/2006/relationships" xmlns:p="http://schemas.openxmlformats.org/presentationml/2006/main">
   <p:cSld>
     <p:spTree>

</xml_diff>